<commit_message>
Another poster file update.
</commit_message>
<xml_diff>
--- a/Poster.pptx
+++ b/Poster.pptx
@@ -12462,12 +12462,20 @@
               <a:t>s to find the key elements about making the perfect </a:t>
             </a:r>
             <a:r>
-              <a:rPr lang="en-US" dirty="0" err="1"/>
-              <a:t>kickstarter</a:t>
+              <a:rPr lang="et-EE" dirty="0" err="1"/>
+              <a:t>K</a:t>
+            </a:r>
+            <a:r>
+              <a:rPr lang="en-US" dirty="0" err="1" smtClean="0"/>
+              <a:t>ickstarter</a:t>
+            </a:r>
+            <a:r>
+              <a:rPr lang="en-US" dirty="0" smtClean="0"/>
+              <a:t> </a:t>
             </a:r>
             <a:r>
               <a:rPr lang="en-US" dirty="0"/>
-              <a:t> project. Of</a:t>
+              <a:t>project. Of</a:t>
             </a:r>
             <a:r>
               <a:rPr lang="et-EE" dirty="0"/>
@@ -12486,15 +12494,27 @@
               <a:t>the most important thing is having a good project idea, but what if your </a:t>
             </a:r>
             <a:r>
-              <a:rPr lang="en-US" dirty="0" err="1"/>
-              <a:t>kickstarter</a:t>
-            </a:r>
-            <a:r>
-              <a:rPr lang="en-US" dirty="0"/>
-              <a:t> Project</a:t>
+              <a:rPr lang="et-EE" dirty="0" err="1"/>
+              <a:t>K</a:t>
+            </a:r>
+            <a:r>
+              <a:rPr lang="en-US" dirty="0" err="1" smtClean="0"/>
+              <a:t>ickstarter</a:t>
+            </a:r>
+            <a:r>
+              <a:rPr lang="en-US" dirty="0" smtClean="0"/>
+              <a:t> </a:t>
             </a:r>
             <a:r>
               <a:rPr lang="et-EE" dirty="0"/>
+              <a:t>p</a:t>
+            </a:r>
+            <a:r>
+              <a:rPr lang="en-US" dirty="0" err="1" smtClean="0"/>
+              <a:t>roject</a:t>
+            </a:r>
+            <a:r>
+              <a:rPr lang="et-EE" dirty="0" smtClean="0"/>
               <a:t> </a:t>
             </a:r>
             <a:r>
@@ -12624,7 +12644,6 @@
               <a:rPr lang="et-EE" dirty="0" smtClean="0"/>
               <a:t>INTRODUCTION</a:t>
             </a:r>
-            <a:endParaRPr lang="et-EE" dirty="0" smtClean="0"/>
           </a:p>
         </p:txBody>
       </p:sp>
@@ -12652,7 +12671,6 @@
               <a:rPr lang="et-EE" dirty="0" smtClean="0"/>
               <a:t>DATA</a:t>
             </a:r>
-            <a:endParaRPr lang="et-EE" dirty="0" smtClean="0"/>
           </a:p>
         </p:txBody>
       </p:sp>
@@ -13476,13 +13494,8 @@
           <a:p>
             <a:r>
               <a:rPr lang="et-EE" dirty="0" smtClean="0"/>
-              <a:t>MATERIALS &amp; </a:t>
-            </a:r>
-            <a:r>
-              <a:rPr lang="et-EE" dirty="0" smtClean="0"/>
-              <a:t>METHODS</a:t>
-            </a:r>
-            <a:endParaRPr lang="et-EE" dirty="0" smtClean="0"/>
+              <a:t>MATERIALS &amp; METHODS</a:t>
+            </a:r>
           </a:p>
         </p:txBody>
       </p:sp>
@@ -13652,7 +13665,6 @@
               <a:rPr lang="et-EE" dirty="0" smtClean="0"/>
               <a:t>PREPROCESSING</a:t>
             </a:r>
-            <a:endParaRPr lang="et-EE" dirty="0" smtClean="0"/>
           </a:p>
         </p:txBody>
       </p:sp>
@@ -14521,7 +14533,55 @@
                 <a:latin typeface="Times New Roman" panose="02020603050405020304" pitchFamily="18" charset="0"/>
                 <a:cs typeface="Times New Roman" panose="02020603050405020304" pitchFamily="18" charset="0"/>
               </a:rPr>
-              <a:t>One of the most important feature in all our classifiers was the goal amount. We found out that the mean goal amount for a successful project was on average about 3.5 times smaller than the amount for a failed one. 95% of the successful projects had a goal that was under 35 000 </a:t>
+              <a:t>One of the most important </a:t>
+            </a:r>
+            <a:r>
+              <a:rPr lang="en-US" sz="2000" dirty="0" smtClean="0">
+                <a:solidFill>
+                  <a:schemeClr val="accent5">
+                    <a:lumMod val="50000"/>
+                  </a:schemeClr>
+                </a:solidFill>
+                <a:latin typeface="Times New Roman" panose="02020603050405020304" pitchFamily="18" charset="0"/>
+                <a:cs typeface="Times New Roman" panose="02020603050405020304" pitchFamily="18" charset="0"/>
+              </a:rPr>
+              <a:t>feature</a:t>
+            </a:r>
+            <a:r>
+              <a:rPr lang="et-EE" sz="2000" dirty="0" smtClean="0">
+                <a:solidFill>
+                  <a:schemeClr val="accent5">
+                    <a:lumMod val="50000"/>
+                  </a:schemeClr>
+                </a:solidFill>
+                <a:latin typeface="Times New Roman" panose="02020603050405020304" pitchFamily="18" charset="0"/>
+                <a:cs typeface="Times New Roman" panose="02020603050405020304" pitchFamily="18" charset="0"/>
+              </a:rPr>
+              <a:t>s</a:t>
+            </a:r>
+            <a:r>
+              <a:rPr lang="en-US" sz="2000" dirty="0" smtClean="0">
+                <a:solidFill>
+                  <a:schemeClr val="accent5">
+                    <a:lumMod val="50000"/>
+                  </a:schemeClr>
+                </a:solidFill>
+                <a:latin typeface="Times New Roman" panose="02020603050405020304" pitchFamily="18" charset="0"/>
+                <a:cs typeface="Times New Roman" panose="02020603050405020304" pitchFamily="18" charset="0"/>
+              </a:rPr>
+              <a:t> </a:t>
+            </a:r>
+            <a:r>
+              <a:rPr lang="en-US" sz="2000" dirty="0">
+                <a:solidFill>
+                  <a:schemeClr val="accent5">
+                    <a:lumMod val="50000"/>
+                  </a:schemeClr>
+                </a:solidFill>
+                <a:latin typeface="Times New Roman" panose="02020603050405020304" pitchFamily="18" charset="0"/>
+                <a:cs typeface="Times New Roman" panose="02020603050405020304" pitchFamily="18" charset="0"/>
+              </a:rPr>
+              <a:t>in all our classifiers was the goal amount. We found out that the mean goal amount for a successful project was on average about 3.5 times smaller than the amount for a failed one. 95% of the successful projects had a goal that was under 35 000 </a:t>
             </a:r>
             <a:r>
               <a:rPr lang="en-US" sz="2000" dirty="0" smtClean="0">
@@ -14578,6 +14638,714 @@
               </a:spcBef>
             </a:pPr>
             <a:r>
+              <a:rPr lang="et-EE" sz="2000" dirty="0" err="1">
+                <a:solidFill>
+                  <a:schemeClr val="accent5">
+                    <a:lumMod val="50000"/>
+                  </a:schemeClr>
+                </a:solidFill>
+                <a:latin typeface="Times New Roman" panose="02020603050405020304" pitchFamily="18" charset="0"/>
+                <a:cs typeface="Times New Roman" panose="02020603050405020304" pitchFamily="18" charset="0"/>
+              </a:rPr>
+              <a:t>We</a:t>
+            </a:r>
+            <a:r>
+              <a:rPr lang="et-EE" sz="2000" dirty="0">
+                <a:solidFill>
+                  <a:schemeClr val="accent5">
+                    <a:lumMod val="50000"/>
+                  </a:schemeClr>
+                </a:solidFill>
+                <a:latin typeface="Times New Roman" panose="02020603050405020304" pitchFamily="18" charset="0"/>
+                <a:cs typeface="Times New Roman" panose="02020603050405020304" pitchFamily="18" charset="0"/>
+              </a:rPr>
+              <a:t> </a:t>
+            </a:r>
+            <a:r>
+              <a:rPr lang="et-EE" sz="2000" dirty="0" err="1">
+                <a:solidFill>
+                  <a:schemeClr val="accent5">
+                    <a:lumMod val="50000"/>
+                  </a:schemeClr>
+                </a:solidFill>
+                <a:latin typeface="Times New Roman" panose="02020603050405020304" pitchFamily="18" charset="0"/>
+                <a:cs typeface="Times New Roman" panose="02020603050405020304" pitchFamily="18" charset="0"/>
+              </a:rPr>
+              <a:t>did</a:t>
+            </a:r>
+            <a:r>
+              <a:rPr lang="et-EE" sz="2000" dirty="0">
+                <a:solidFill>
+                  <a:schemeClr val="accent5">
+                    <a:lumMod val="50000"/>
+                  </a:schemeClr>
+                </a:solidFill>
+                <a:latin typeface="Times New Roman" panose="02020603050405020304" pitchFamily="18" charset="0"/>
+                <a:cs typeface="Times New Roman" panose="02020603050405020304" pitchFamily="18" charset="0"/>
+              </a:rPr>
+              <a:t> </a:t>
+            </a:r>
+            <a:r>
+              <a:rPr lang="et-EE" sz="2000" dirty="0" err="1">
+                <a:solidFill>
+                  <a:schemeClr val="accent5">
+                    <a:lumMod val="50000"/>
+                  </a:schemeClr>
+                </a:solidFill>
+                <a:latin typeface="Times New Roman" panose="02020603050405020304" pitchFamily="18" charset="0"/>
+                <a:cs typeface="Times New Roman" panose="02020603050405020304" pitchFamily="18" charset="0"/>
+              </a:rPr>
+              <a:t>not</a:t>
+            </a:r>
+            <a:r>
+              <a:rPr lang="et-EE" sz="2000" dirty="0">
+                <a:solidFill>
+                  <a:schemeClr val="accent5">
+                    <a:lumMod val="50000"/>
+                  </a:schemeClr>
+                </a:solidFill>
+                <a:latin typeface="Times New Roman" panose="02020603050405020304" pitchFamily="18" charset="0"/>
+                <a:cs typeface="Times New Roman" panose="02020603050405020304" pitchFamily="18" charset="0"/>
+              </a:rPr>
+              <a:t> </a:t>
+            </a:r>
+            <a:r>
+              <a:rPr lang="et-EE" sz="2000" dirty="0" err="1">
+                <a:solidFill>
+                  <a:schemeClr val="accent5">
+                    <a:lumMod val="50000"/>
+                  </a:schemeClr>
+                </a:solidFill>
+                <a:latin typeface="Times New Roman" panose="02020603050405020304" pitchFamily="18" charset="0"/>
+                <a:cs typeface="Times New Roman" panose="02020603050405020304" pitchFamily="18" charset="0"/>
+              </a:rPr>
+              <a:t>reach</a:t>
+            </a:r>
+            <a:r>
+              <a:rPr lang="et-EE" sz="2000" dirty="0">
+                <a:solidFill>
+                  <a:schemeClr val="accent5">
+                    <a:lumMod val="50000"/>
+                  </a:schemeClr>
+                </a:solidFill>
+                <a:latin typeface="Times New Roman" panose="02020603050405020304" pitchFamily="18" charset="0"/>
+                <a:cs typeface="Times New Roman" panose="02020603050405020304" pitchFamily="18" charset="0"/>
+              </a:rPr>
+              <a:t> </a:t>
+            </a:r>
+            <a:r>
+              <a:rPr lang="et-EE" sz="2000" dirty="0" err="1">
+                <a:solidFill>
+                  <a:schemeClr val="accent5">
+                    <a:lumMod val="50000"/>
+                  </a:schemeClr>
+                </a:solidFill>
+                <a:latin typeface="Times New Roman" panose="02020603050405020304" pitchFamily="18" charset="0"/>
+                <a:cs typeface="Times New Roman" panose="02020603050405020304" pitchFamily="18" charset="0"/>
+              </a:rPr>
+              <a:t>our</a:t>
+            </a:r>
+            <a:r>
+              <a:rPr lang="et-EE" sz="2000" dirty="0">
+                <a:solidFill>
+                  <a:schemeClr val="accent5">
+                    <a:lumMod val="50000"/>
+                  </a:schemeClr>
+                </a:solidFill>
+                <a:latin typeface="Times New Roman" panose="02020603050405020304" pitchFamily="18" charset="0"/>
+                <a:cs typeface="Times New Roman" panose="02020603050405020304" pitchFamily="18" charset="0"/>
+              </a:rPr>
+              <a:t> </a:t>
+            </a:r>
+            <a:r>
+              <a:rPr lang="et-EE" sz="2000" dirty="0" err="1">
+                <a:solidFill>
+                  <a:schemeClr val="accent5">
+                    <a:lumMod val="50000"/>
+                  </a:schemeClr>
+                </a:solidFill>
+                <a:latin typeface="Times New Roman" panose="02020603050405020304" pitchFamily="18" charset="0"/>
+                <a:cs typeface="Times New Roman" panose="02020603050405020304" pitchFamily="18" charset="0"/>
+              </a:rPr>
+              <a:t>goal</a:t>
+            </a:r>
+            <a:r>
+              <a:rPr lang="et-EE" sz="2000" dirty="0">
+                <a:solidFill>
+                  <a:schemeClr val="accent5">
+                    <a:lumMod val="50000"/>
+                  </a:schemeClr>
+                </a:solidFill>
+                <a:latin typeface="Times New Roman" panose="02020603050405020304" pitchFamily="18" charset="0"/>
+                <a:cs typeface="Times New Roman" panose="02020603050405020304" pitchFamily="18" charset="0"/>
+              </a:rPr>
+              <a:t> of </a:t>
+            </a:r>
+            <a:r>
+              <a:rPr lang="et-EE" sz="2000" dirty="0" err="1">
+                <a:solidFill>
+                  <a:schemeClr val="accent5">
+                    <a:lumMod val="50000"/>
+                  </a:schemeClr>
+                </a:solidFill>
+                <a:latin typeface="Times New Roman" panose="02020603050405020304" pitchFamily="18" charset="0"/>
+                <a:cs typeface="Times New Roman" panose="02020603050405020304" pitchFamily="18" charset="0"/>
+              </a:rPr>
+              <a:t>being</a:t>
+            </a:r>
+            <a:r>
+              <a:rPr lang="et-EE" sz="2000" dirty="0">
+                <a:solidFill>
+                  <a:schemeClr val="accent5">
+                    <a:lumMod val="50000"/>
+                  </a:schemeClr>
+                </a:solidFill>
+                <a:latin typeface="Times New Roman" panose="02020603050405020304" pitchFamily="18" charset="0"/>
+                <a:cs typeface="Times New Roman" panose="02020603050405020304" pitchFamily="18" charset="0"/>
+              </a:rPr>
+              <a:t> </a:t>
+            </a:r>
+            <a:r>
+              <a:rPr lang="et-EE" sz="2000" dirty="0" err="1">
+                <a:solidFill>
+                  <a:schemeClr val="accent5">
+                    <a:lumMod val="50000"/>
+                  </a:schemeClr>
+                </a:solidFill>
+                <a:latin typeface="Times New Roman" panose="02020603050405020304" pitchFamily="18" charset="0"/>
+                <a:cs typeface="Times New Roman" panose="02020603050405020304" pitchFamily="18" charset="0"/>
+              </a:rPr>
+              <a:t>able</a:t>
+            </a:r>
+            <a:r>
+              <a:rPr lang="et-EE" sz="2000" dirty="0">
+                <a:solidFill>
+                  <a:schemeClr val="accent5">
+                    <a:lumMod val="50000"/>
+                  </a:schemeClr>
+                </a:solidFill>
+                <a:latin typeface="Times New Roman" panose="02020603050405020304" pitchFamily="18" charset="0"/>
+                <a:cs typeface="Times New Roman" panose="02020603050405020304" pitchFamily="18" charset="0"/>
+              </a:rPr>
+              <a:t> </a:t>
+            </a:r>
+            <a:r>
+              <a:rPr lang="et-EE" sz="2000" dirty="0" err="1">
+                <a:solidFill>
+                  <a:schemeClr val="accent5">
+                    <a:lumMod val="50000"/>
+                  </a:schemeClr>
+                </a:solidFill>
+                <a:latin typeface="Times New Roman" panose="02020603050405020304" pitchFamily="18" charset="0"/>
+                <a:cs typeface="Times New Roman" panose="02020603050405020304" pitchFamily="18" charset="0"/>
+              </a:rPr>
+              <a:t>to</a:t>
+            </a:r>
+            <a:r>
+              <a:rPr lang="et-EE" sz="2000" dirty="0">
+                <a:solidFill>
+                  <a:schemeClr val="accent5">
+                    <a:lumMod val="50000"/>
+                  </a:schemeClr>
+                </a:solidFill>
+                <a:latin typeface="Times New Roman" panose="02020603050405020304" pitchFamily="18" charset="0"/>
+                <a:cs typeface="Times New Roman" panose="02020603050405020304" pitchFamily="18" charset="0"/>
+              </a:rPr>
+              <a:t> </a:t>
+            </a:r>
+            <a:r>
+              <a:rPr lang="et-EE" sz="2000" dirty="0" err="1">
+                <a:solidFill>
+                  <a:schemeClr val="accent5">
+                    <a:lumMod val="50000"/>
+                  </a:schemeClr>
+                </a:solidFill>
+                <a:latin typeface="Times New Roman" panose="02020603050405020304" pitchFamily="18" charset="0"/>
+                <a:cs typeface="Times New Roman" panose="02020603050405020304" pitchFamily="18" charset="0"/>
+              </a:rPr>
+              <a:t>predict</a:t>
+            </a:r>
+            <a:r>
+              <a:rPr lang="et-EE" sz="2000" dirty="0">
+                <a:solidFill>
+                  <a:schemeClr val="accent5">
+                    <a:lumMod val="50000"/>
+                  </a:schemeClr>
+                </a:solidFill>
+                <a:latin typeface="Times New Roman" panose="02020603050405020304" pitchFamily="18" charset="0"/>
+                <a:cs typeface="Times New Roman" panose="02020603050405020304" pitchFamily="18" charset="0"/>
+              </a:rPr>
+              <a:t> </a:t>
+            </a:r>
+            <a:r>
+              <a:rPr lang="et-EE" sz="2000" dirty="0" err="1">
+                <a:solidFill>
+                  <a:schemeClr val="accent5">
+                    <a:lumMod val="50000"/>
+                  </a:schemeClr>
+                </a:solidFill>
+                <a:latin typeface="Times New Roman" panose="02020603050405020304" pitchFamily="18" charset="0"/>
+                <a:cs typeface="Times New Roman" panose="02020603050405020304" pitchFamily="18" charset="0"/>
+              </a:rPr>
+              <a:t>accurately</a:t>
+            </a:r>
+            <a:r>
+              <a:rPr lang="et-EE" sz="2000" dirty="0">
+                <a:solidFill>
+                  <a:schemeClr val="accent5">
+                    <a:lumMod val="50000"/>
+                  </a:schemeClr>
+                </a:solidFill>
+                <a:latin typeface="Times New Roman" panose="02020603050405020304" pitchFamily="18" charset="0"/>
+                <a:cs typeface="Times New Roman" panose="02020603050405020304" pitchFamily="18" charset="0"/>
+              </a:rPr>
+              <a:t> </a:t>
+            </a:r>
+            <a:r>
+              <a:rPr lang="en-GB" sz="2000" dirty="0">
+                <a:solidFill>
+                  <a:schemeClr val="accent5">
+                    <a:lumMod val="50000"/>
+                  </a:schemeClr>
+                </a:solidFill>
+                <a:latin typeface="Times New Roman" panose="02020603050405020304" pitchFamily="18" charset="0"/>
+                <a:cs typeface="Times New Roman" panose="02020603050405020304" pitchFamily="18" charset="0"/>
+              </a:rPr>
+              <a:t>whether</a:t>
+            </a:r>
+            <a:r>
+              <a:rPr lang="et-EE" sz="2000" dirty="0">
+                <a:solidFill>
+                  <a:schemeClr val="accent5">
+                    <a:lumMod val="50000"/>
+                  </a:schemeClr>
+                </a:solidFill>
+                <a:latin typeface="Times New Roman" panose="02020603050405020304" pitchFamily="18" charset="0"/>
+                <a:cs typeface="Times New Roman" panose="02020603050405020304" pitchFamily="18" charset="0"/>
+              </a:rPr>
+              <a:t> a </a:t>
+            </a:r>
+            <a:r>
+              <a:rPr lang="et-EE" sz="2000" dirty="0" err="1">
+                <a:solidFill>
+                  <a:schemeClr val="accent5">
+                    <a:lumMod val="50000"/>
+                  </a:schemeClr>
+                </a:solidFill>
+                <a:latin typeface="Times New Roman" panose="02020603050405020304" pitchFamily="18" charset="0"/>
+                <a:cs typeface="Times New Roman" panose="02020603050405020304" pitchFamily="18" charset="0"/>
+              </a:rPr>
+              <a:t>Kickstarter</a:t>
+            </a:r>
+            <a:r>
+              <a:rPr lang="et-EE" sz="2000" dirty="0">
+                <a:solidFill>
+                  <a:schemeClr val="accent5">
+                    <a:lumMod val="50000"/>
+                  </a:schemeClr>
+                </a:solidFill>
+                <a:latin typeface="Times New Roman" panose="02020603050405020304" pitchFamily="18" charset="0"/>
+                <a:cs typeface="Times New Roman" panose="02020603050405020304" pitchFamily="18" charset="0"/>
+              </a:rPr>
+              <a:t> </a:t>
+            </a:r>
+            <a:r>
+              <a:rPr lang="et-EE" sz="2000" dirty="0" err="1">
+                <a:solidFill>
+                  <a:schemeClr val="accent5">
+                    <a:lumMod val="50000"/>
+                  </a:schemeClr>
+                </a:solidFill>
+                <a:latin typeface="Times New Roman" panose="02020603050405020304" pitchFamily="18" charset="0"/>
+                <a:cs typeface="Times New Roman" panose="02020603050405020304" pitchFamily="18" charset="0"/>
+              </a:rPr>
+              <a:t>project</a:t>
+            </a:r>
+            <a:r>
+              <a:rPr lang="et-EE" sz="2000" dirty="0">
+                <a:solidFill>
+                  <a:schemeClr val="accent5">
+                    <a:lumMod val="50000"/>
+                  </a:schemeClr>
+                </a:solidFill>
+                <a:latin typeface="Times New Roman" panose="02020603050405020304" pitchFamily="18" charset="0"/>
+                <a:cs typeface="Times New Roman" panose="02020603050405020304" pitchFamily="18" charset="0"/>
+              </a:rPr>
+              <a:t> </a:t>
+            </a:r>
+            <a:r>
+              <a:rPr lang="et-EE" sz="2000" dirty="0" err="1">
+                <a:solidFill>
+                  <a:schemeClr val="accent5">
+                    <a:lumMod val="50000"/>
+                  </a:schemeClr>
+                </a:solidFill>
+                <a:latin typeface="Times New Roman" panose="02020603050405020304" pitchFamily="18" charset="0"/>
+                <a:cs typeface="Times New Roman" panose="02020603050405020304" pitchFamily="18" charset="0"/>
+              </a:rPr>
+              <a:t>will</a:t>
+            </a:r>
+            <a:r>
+              <a:rPr lang="et-EE" sz="2000" dirty="0">
+                <a:solidFill>
+                  <a:schemeClr val="accent5">
+                    <a:lumMod val="50000"/>
+                  </a:schemeClr>
+                </a:solidFill>
+                <a:latin typeface="Times New Roman" panose="02020603050405020304" pitchFamily="18" charset="0"/>
+                <a:cs typeface="Times New Roman" panose="02020603050405020304" pitchFamily="18" charset="0"/>
+              </a:rPr>
+              <a:t> </a:t>
+            </a:r>
+            <a:r>
+              <a:rPr lang="et-EE" sz="2000" dirty="0" err="1">
+                <a:solidFill>
+                  <a:schemeClr val="accent5">
+                    <a:lumMod val="50000"/>
+                  </a:schemeClr>
+                </a:solidFill>
+                <a:latin typeface="Times New Roman" panose="02020603050405020304" pitchFamily="18" charset="0"/>
+                <a:cs typeface="Times New Roman" panose="02020603050405020304" pitchFamily="18" charset="0"/>
+              </a:rPr>
+              <a:t>succeed</a:t>
+            </a:r>
+            <a:r>
+              <a:rPr lang="et-EE" sz="2000" dirty="0">
+                <a:solidFill>
+                  <a:schemeClr val="accent5">
+                    <a:lumMod val="50000"/>
+                  </a:schemeClr>
+                </a:solidFill>
+                <a:latin typeface="Times New Roman" panose="02020603050405020304" pitchFamily="18" charset="0"/>
+                <a:cs typeface="Times New Roman" panose="02020603050405020304" pitchFamily="18" charset="0"/>
+              </a:rPr>
+              <a:t> </a:t>
+            </a:r>
+            <a:r>
+              <a:rPr lang="et-EE" sz="2000" dirty="0" err="1">
+                <a:solidFill>
+                  <a:schemeClr val="accent5">
+                    <a:lumMod val="50000"/>
+                  </a:schemeClr>
+                </a:solidFill>
+                <a:latin typeface="Times New Roman" panose="02020603050405020304" pitchFamily="18" charset="0"/>
+                <a:cs typeface="Times New Roman" panose="02020603050405020304" pitchFamily="18" charset="0"/>
+              </a:rPr>
+              <a:t>or</a:t>
+            </a:r>
+            <a:r>
+              <a:rPr lang="et-EE" sz="2000" dirty="0">
+                <a:solidFill>
+                  <a:schemeClr val="accent5">
+                    <a:lumMod val="50000"/>
+                  </a:schemeClr>
+                </a:solidFill>
+                <a:latin typeface="Times New Roman" panose="02020603050405020304" pitchFamily="18" charset="0"/>
+                <a:cs typeface="Times New Roman" panose="02020603050405020304" pitchFamily="18" charset="0"/>
+              </a:rPr>
+              <a:t> fail, </a:t>
+            </a:r>
+            <a:r>
+              <a:rPr lang="et-EE" sz="2000" dirty="0" err="1">
+                <a:solidFill>
+                  <a:schemeClr val="accent5">
+                    <a:lumMod val="50000"/>
+                  </a:schemeClr>
+                </a:solidFill>
+                <a:latin typeface="Times New Roman" panose="02020603050405020304" pitchFamily="18" charset="0"/>
+                <a:cs typeface="Times New Roman" panose="02020603050405020304" pitchFamily="18" charset="0"/>
+              </a:rPr>
+              <a:t>but</a:t>
+            </a:r>
+            <a:r>
+              <a:rPr lang="et-EE" sz="2000" dirty="0">
+                <a:solidFill>
+                  <a:schemeClr val="accent5">
+                    <a:lumMod val="50000"/>
+                  </a:schemeClr>
+                </a:solidFill>
+                <a:latin typeface="Times New Roman" panose="02020603050405020304" pitchFamily="18" charset="0"/>
+                <a:cs typeface="Times New Roman" panose="02020603050405020304" pitchFamily="18" charset="0"/>
+              </a:rPr>
+              <a:t> </a:t>
+            </a:r>
+            <a:r>
+              <a:rPr lang="et-EE" sz="2000" dirty="0" err="1">
+                <a:solidFill>
+                  <a:schemeClr val="accent5">
+                    <a:lumMod val="50000"/>
+                  </a:schemeClr>
+                </a:solidFill>
+                <a:latin typeface="Times New Roman" panose="02020603050405020304" pitchFamily="18" charset="0"/>
+                <a:cs typeface="Times New Roman" panose="02020603050405020304" pitchFamily="18" charset="0"/>
+              </a:rPr>
+              <a:t>we</a:t>
+            </a:r>
+            <a:r>
+              <a:rPr lang="et-EE" sz="2000" dirty="0">
+                <a:solidFill>
+                  <a:schemeClr val="accent5">
+                    <a:lumMod val="50000"/>
+                  </a:schemeClr>
+                </a:solidFill>
+                <a:latin typeface="Times New Roman" panose="02020603050405020304" pitchFamily="18" charset="0"/>
+                <a:cs typeface="Times New Roman" panose="02020603050405020304" pitchFamily="18" charset="0"/>
+              </a:rPr>
+              <a:t> </a:t>
+            </a:r>
+            <a:r>
+              <a:rPr lang="et-EE" sz="2000" dirty="0" err="1">
+                <a:solidFill>
+                  <a:schemeClr val="accent5">
+                    <a:lumMod val="50000"/>
+                  </a:schemeClr>
+                </a:solidFill>
+                <a:latin typeface="Times New Roman" panose="02020603050405020304" pitchFamily="18" charset="0"/>
+                <a:cs typeface="Times New Roman" panose="02020603050405020304" pitchFamily="18" charset="0"/>
+              </a:rPr>
+              <a:t>managed</a:t>
+            </a:r>
+            <a:r>
+              <a:rPr lang="et-EE" sz="2000" dirty="0">
+                <a:solidFill>
+                  <a:schemeClr val="accent5">
+                    <a:lumMod val="50000"/>
+                  </a:schemeClr>
+                </a:solidFill>
+                <a:latin typeface="Times New Roman" panose="02020603050405020304" pitchFamily="18" charset="0"/>
+                <a:cs typeface="Times New Roman" panose="02020603050405020304" pitchFamily="18" charset="0"/>
+              </a:rPr>
+              <a:t> </a:t>
+            </a:r>
+            <a:r>
+              <a:rPr lang="et-EE" sz="2000" dirty="0" err="1">
+                <a:solidFill>
+                  <a:schemeClr val="accent5">
+                    <a:lumMod val="50000"/>
+                  </a:schemeClr>
+                </a:solidFill>
+                <a:latin typeface="Times New Roman" panose="02020603050405020304" pitchFamily="18" charset="0"/>
+                <a:cs typeface="Times New Roman" panose="02020603050405020304" pitchFamily="18" charset="0"/>
+              </a:rPr>
+              <a:t>to</a:t>
+            </a:r>
+            <a:r>
+              <a:rPr lang="et-EE" sz="2000" dirty="0">
+                <a:solidFill>
+                  <a:schemeClr val="accent5">
+                    <a:lumMod val="50000"/>
+                  </a:schemeClr>
+                </a:solidFill>
+                <a:latin typeface="Times New Roman" panose="02020603050405020304" pitchFamily="18" charset="0"/>
+                <a:cs typeface="Times New Roman" panose="02020603050405020304" pitchFamily="18" charset="0"/>
+              </a:rPr>
+              <a:t> </a:t>
+            </a:r>
+            <a:r>
+              <a:rPr lang="et-EE" sz="2000" dirty="0" err="1">
+                <a:solidFill>
+                  <a:schemeClr val="accent5">
+                    <a:lumMod val="50000"/>
+                  </a:schemeClr>
+                </a:solidFill>
+                <a:latin typeface="Times New Roman" panose="02020603050405020304" pitchFamily="18" charset="0"/>
+                <a:cs typeface="Times New Roman" panose="02020603050405020304" pitchFamily="18" charset="0"/>
+              </a:rPr>
+              <a:t>find</a:t>
+            </a:r>
+            <a:r>
+              <a:rPr lang="et-EE" sz="2000" dirty="0">
+                <a:solidFill>
+                  <a:schemeClr val="accent5">
+                    <a:lumMod val="50000"/>
+                  </a:schemeClr>
+                </a:solidFill>
+                <a:latin typeface="Times New Roman" panose="02020603050405020304" pitchFamily="18" charset="0"/>
+                <a:cs typeface="Times New Roman" panose="02020603050405020304" pitchFamily="18" charset="0"/>
+              </a:rPr>
+              <a:t> </a:t>
+            </a:r>
+            <a:r>
+              <a:rPr lang="et-EE" sz="2000" dirty="0" err="1">
+                <a:solidFill>
+                  <a:schemeClr val="accent5">
+                    <a:lumMod val="50000"/>
+                  </a:schemeClr>
+                </a:solidFill>
+                <a:latin typeface="Times New Roman" panose="02020603050405020304" pitchFamily="18" charset="0"/>
+                <a:cs typeface="Times New Roman" panose="02020603050405020304" pitchFamily="18" charset="0"/>
+              </a:rPr>
+              <a:t>out</a:t>
+            </a:r>
+            <a:r>
+              <a:rPr lang="et-EE" sz="2000" dirty="0">
+                <a:solidFill>
+                  <a:schemeClr val="accent5">
+                    <a:lumMod val="50000"/>
+                  </a:schemeClr>
+                </a:solidFill>
+                <a:latin typeface="Times New Roman" panose="02020603050405020304" pitchFamily="18" charset="0"/>
+                <a:cs typeface="Times New Roman" panose="02020603050405020304" pitchFamily="18" charset="0"/>
+              </a:rPr>
+              <a:t> </a:t>
+            </a:r>
+            <a:r>
+              <a:rPr lang="et-EE" sz="2000" dirty="0" err="1">
+                <a:solidFill>
+                  <a:schemeClr val="accent5">
+                    <a:lumMod val="50000"/>
+                  </a:schemeClr>
+                </a:solidFill>
+                <a:latin typeface="Times New Roman" panose="02020603050405020304" pitchFamily="18" charset="0"/>
+                <a:cs typeface="Times New Roman" panose="02020603050405020304" pitchFamily="18" charset="0"/>
+              </a:rPr>
+              <a:t>some</a:t>
+            </a:r>
+            <a:r>
+              <a:rPr lang="et-EE" sz="2000" dirty="0">
+                <a:solidFill>
+                  <a:schemeClr val="accent5">
+                    <a:lumMod val="50000"/>
+                  </a:schemeClr>
+                </a:solidFill>
+                <a:latin typeface="Times New Roman" panose="02020603050405020304" pitchFamily="18" charset="0"/>
+                <a:cs typeface="Times New Roman" panose="02020603050405020304" pitchFamily="18" charset="0"/>
+              </a:rPr>
+              <a:t> </a:t>
+            </a:r>
+            <a:r>
+              <a:rPr lang="et-EE" sz="2000" dirty="0" err="1">
+                <a:solidFill>
+                  <a:schemeClr val="accent5">
+                    <a:lumMod val="50000"/>
+                  </a:schemeClr>
+                </a:solidFill>
+                <a:latin typeface="Times New Roman" panose="02020603050405020304" pitchFamily="18" charset="0"/>
+                <a:cs typeface="Times New Roman" panose="02020603050405020304" pitchFamily="18" charset="0"/>
+              </a:rPr>
+              <a:t>key</a:t>
+            </a:r>
+            <a:r>
+              <a:rPr lang="et-EE" sz="2000" dirty="0">
+                <a:solidFill>
+                  <a:schemeClr val="accent5">
+                    <a:lumMod val="50000"/>
+                  </a:schemeClr>
+                </a:solidFill>
+                <a:latin typeface="Times New Roman" panose="02020603050405020304" pitchFamily="18" charset="0"/>
+                <a:cs typeface="Times New Roman" panose="02020603050405020304" pitchFamily="18" charset="0"/>
+              </a:rPr>
+              <a:t> </a:t>
+            </a:r>
+            <a:r>
+              <a:rPr lang="et-EE" sz="2000" dirty="0" err="1">
+                <a:solidFill>
+                  <a:schemeClr val="accent5">
+                    <a:lumMod val="50000"/>
+                  </a:schemeClr>
+                </a:solidFill>
+                <a:latin typeface="Times New Roman" panose="02020603050405020304" pitchFamily="18" charset="0"/>
+                <a:cs typeface="Times New Roman" panose="02020603050405020304" pitchFamily="18" charset="0"/>
+              </a:rPr>
+              <a:t>elements</a:t>
+            </a:r>
+            <a:r>
+              <a:rPr lang="et-EE" sz="2000" dirty="0">
+                <a:solidFill>
+                  <a:schemeClr val="accent5">
+                    <a:lumMod val="50000"/>
+                  </a:schemeClr>
+                </a:solidFill>
+                <a:latin typeface="Times New Roman" panose="02020603050405020304" pitchFamily="18" charset="0"/>
+                <a:cs typeface="Times New Roman" panose="02020603050405020304" pitchFamily="18" charset="0"/>
+              </a:rPr>
+              <a:t> of a </a:t>
+            </a:r>
+            <a:r>
+              <a:rPr lang="et-EE" sz="2000" dirty="0" err="1">
+                <a:solidFill>
+                  <a:schemeClr val="accent5">
+                    <a:lumMod val="50000"/>
+                  </a:schemeClr>
+                </a:solidFill>
+                <a:latin typeface="Times New Roman" panose="02020603050405020304" pitchFamily="18" charset="0"/>
+                <a:cs typeface="Times New Roman" panose="02020603050405020304" pitchFamily="18" charset="0"/>
+              </a:rPr>
+              <a:t>good</a:t>
+            </a:r>
+            <a:r>
+              <a:rPr lang="et-EE" sz="2000" dirty="0">
+                <a:solidFill>
+                  <a:schemeClr val="accent5">
+                    <a:lumMod val="50000"/>
+                  </a:schemeClr>
+                </a:solidFill>
+                <a:latin typeface="Times New Roman" panose="02020603050405020304" pitchFamily="18" charset="0"/>
+                <a:cs typeface="Times New Roman" panose="02020603050405020304" pitchFamily="18" charset="0"/>
+              </a:rPr>
+              <a:t> </a:t>
+            </a:r>
+            <a:r>
+              <a:rPr lang="et-EE" sz="2000" dirty="0" err="1">
+                <a:solidFill>
+                  <a:schemeClr val="accent5">
+                    <a:lumMod val="50000"/>
+                  </a:schemeClr>
+                </a:solidFill>
+                <a:latin typeface="Times New Roman" panose="02020603050405020304" pitchFamily="18" charset="0"/>
+                <a:cs typeface="Times New Roman" panose="02020603050405020304" pitchFamily="18" charset="0"/>
+              </a:rPr>
+              <a:t>project</a:t>
+            </a:r>
+            <a:r>
+              <a:rPr lang="et-EE" sz="2000" dirty="0">
+                <a:solidFill>
+                  <a:schemeClr val="accent5">
+                    <a:lumMod val="50000"/>
+                  </a:schemeClr>
+                </a:solidFill>
+                <a:latin typeface="Times New Roman" panose="02020603050405020304" pitchFamily="18" charset="0"/>
+                <a:cs typeface="Times New Roman" panose="02020603050405020304" pitchFamily="18" charset="0"/>
+              </a:rPr>
+              <a:t>. </a:t>
+            </a:r>
+            <a:r>
+              <a:rPr lang="en-US" sz="2000" dirty="0">
+                <a:solidFill>
+                  <a:schemeClr val="accent5">
+                    <a:lumMod val="50000"/>
+                  </a:schemeClr>
+                </a:solidFill>
+                <a:latin typeface="Times New Roman" panose="02020603050405020304" pitchFamily="18" charset="0"/>
+                <a:cs typeface="Times New Roman" panose="02020603050405020304" pitchFamily="18" charset="0"/>
+              </a:rPr>
+              <a:t>We got our predictions up to 70% accuracy with project category and title as the only semantic features</a:t>
+            </a:r>
+            <a:r>
+              <a:rPr lang="en-US" sz="2000" dirty="0" smtClean="0">
+                <a:solidFill>
+                  <a:schemeClr val="accent5">
+                    <a:lumMod val="50000"/>
+                  </a:schemeClr>
+                </a:solidFill>
+                <a:latin typeface="Times New Roman" panose="02020603050405020304" pitchFamily="18" charset="0"/>
+                <a:cs typeface="Times New Roman" panose="02020603050405020304" pitchFamily="18" charset="0"/>
+              </a:rPr>
+              <a:t>.</a:t>
+            </a:r>
+            <a:r>
+              <a:rPr lang="et-EE" sz="2000" dirty="0" smtClean="0">
+                <a:solidFill>
+                  <a:schemeClr val="accent5">
+                    <a:lumMod val="50000"/>
+                  </a:schemeClr>
+                </a:solidFill>
+                <a:latin typeface="Times New Roman" panose="02020603050405020304" pitchFamily="18" charset="0"/>
+                <a:cs typeface="Times New Roman" panose="02020603050405020304" pitchFamily="18" charset="0"/>
+              </a:rPr>
+              <a:t> </a:t>
+            </a:r>
+            <a:r>
               <a:rPr lang="et-EE" sz="2000" dirty="0" err="1" smtClean="0">
                 <a:solidFill>
                   <a:schemeClr val="accent5">
@@ -14602,19 +15370,19 @@
               <a:t> </a:t>
             </a:r>
             <a:r>
-              <a:rPr lang="et-EE" sz="2000" dirty="0" err="1" smtClean="0">
-                <a:solidFill>
-                  <a:schemeClr val="accent5">
-                    <a:lumMod val="50000"/>
-                  </a:schemeClr>
-                </a:solidFill>
-                <a:latin typeface="Times New Roman" panose="02020603050405020304" pitchFamily="18" charset="0"/>
-                <a:cs typeface="Times New Roman" panose="02020603050405020304" pitchFamily="18" charset="0"/>
-              </a:rPr>
-              <a:t>did</a:t>
-            </a:r>
-            <a:r>
-              <a:rPr lang="et-EE" sz="2000" dirty="0" smtClean="0">
+              <a:rPr lang="et-EE" sz="2000" dirty="0" err="1">
+                <a:solidFill>
+                  <a:schemeClr val="accent5">
+                    <a:lumMod val="50000"/>
+                  </a:schemeClr>
+                </a:solidFill>
+                <a:latin typeface="Times New Roman" panose="02020603050405020304" pitchFamily="18" charset="0"/>
+                <a:cs typeface="Times New Roman" panose="02020603050405020304" pitchFamily="18" charset="0"/>
+              </a:rPr>
+              <a:t>also</a:t>
+            </a:r>
+            <a:r>
+              <a:rPr lang="et-EE" sz="2000" dirty="0">
                 <a:solidFill>
                   <a:schemeClr val="accent5">
                     <a:lumMod val="50000"/>
@@ -14626,19 +15394,19 @@
               <a:t> </a:t>
             </a:r>
             <a:r>
-              <a:rPr lang="et-EE" sz="2000" dirty="0" err="1" smtClean="0">
-                <a:solidFill>
-                  <a:schemeClr val="accent5">
-                    <a:lumMod val="50000"/>
-                  </a:schemeClr>
-                </a:solidFill>
-                <a:latin typeface="Times New Roman" panose="02020603050405020304" pitchFamily="18" charset="0"/>
-                <a:cs typeface="Times New Roman" panose="02020603050405020304" pitchFamily="18" charset="0"/>
-              </a:rPr>
-              <a:t>not</a:t>
-            </a:r>
-            <a:r>
-              <a:rPr lang="et-EE" sz="2000" dirty="0" smtClean="0">
+              <a:rPr lang="et-EE" sz="2000" dirty="0" err="1">
+                <a:solidFill>
+                  <a:schemeClr val="accent5">
+                    <a:lumMod val="50000"/>
+                  </a:schemeClr>
+                </a:solidFill>
+                <a:latin typeface="Times New Roman" panose="02020603050405020304" pitchFamily="18" charset="0"/>
+                <a:cs typeface="Times New Roman" panose="02020603050405020304" pitchFamily="18" charset="0"/>
+              </a:rPr>
+              <a:t>found</a:t>
+            </a:r>
+            <a:r>
+              <a:rPr lang="et-EE" sz="2000" dirty="0">
                 <a:solidFill>
                   <a:schemeClr val="accent5">
                     <a:lumMod val="50000"/>
@@ -14650,19 +15418,43 @@
               <a:t> </a:t>
             </a:r>
             <a:r>
-              <a:rPr lang="et-EE" sz="2000" dirty="0" err="1" smtClean="0">
-                <a:solidFill>
-                  <a:schemeClr val="accent5">
-                    <a:lumMod val="50000"/>
-                  </a:schemeClr>
-                </a:solidFill>
-                <a:latin typeface="Times New Roman" panose="02020603050405020304" pitchFamily="18" charset="0"/>
-                <a:cs typeface="Times New Roman" panose="02020603050405020304" pitchFamily="18" charset="0"/>
-              </a:rPr>
-              <a:t>reach</a:t>
-            </a:r>
-            <a:r>
-              <a:rPr lang="et-EE" sz="2000" dirty="0" smtClean="0">
+              <a:rPr lang="et-EE" sz="2000" dirty="0" err="1">
+                <a:solidFill>
+                  <a:schemeClr val="accent5">
+                    <a:lumMod val="50000"/>
+                  </a:schemeClr>
+                </a:solidFill>
+                <a:latin typeface="Times New Roman" panose="02020603050405020304" pitchFamily="18" charset="0"/>
+                <a:cs typeface="Times New Roman" panose="02020603050405020304" pitchFamily="18" charset="0"/>
+              </a:rPr>
+              <a:t>that</a:t>
+            </a:r>
+            <a:r>
+              <a:rPr lang="et-EE" sz="2000" dirty="0">
+                <a:solidFill>
+                  <a:schemeClr val="accent5">
+                    <a:lumMod val="50000"/>
+                  </a:schemeClr>
+                </a:solidFill>
+                <a:latin typeface="Times New Roman" panose="02020603050405020304" pitchFamily="18" charset="0"/>
+                <a:cs typeface="Times New Roman" panose="02020603050405020304" pitchFamily="18" charset="0"/>
+              </a:rPr>
+              <a:t> on a </a:t>
+            </a:r>
+            <a:r>
+              <a:rPr lang="et-EE" sz="2000" dirty="0" err="1">
+                <a:solidFill>
+                  <a:schemeClr val="accent5">
+                    <a:lumMod val="50000"/>
+                  </a:schemeClr>
+                </a:solidFill>
+                <a:latin typeface="Times New Roman" panose="02020603050405020304" pitchFamily="18" charset="0"/>
+                <a:cs typeface="Times New Roman" panose="02020603050405020304" pitchFamily="18" charset="0"/>
+              </a:rPr>
+              <a:t>dataset</a:t>
+            </a:r>
+            <a:r>
+              <a:rPr lang="et-EE" sz="2000" dirty="0">
                 <a:solidFill>
                   <a:schemeClr val="accent5">
                     <a:lumMod val="50000"/>
@@ -14674,19 +15466,19 @@
               <a:t> </a:t>
             </a:r>
             <a:r>
-              <a:rPr lang="et-EE" sz="2000" dirty="0" err="1" smtClean="0">
-                <a:solidFill>
-                  <a:schemeClr val="accent5">
-                    <a:lumMod val="50000"/>
-                  </a:schemeClr>
-                </a:solidFill>
-                <a:latin typeface="Times New Roman" panose="02020603050405020304" pitchFamily="18" charset="0"/>
-                <a:cs typeface="Times New Roman" panose="02020603050405020304" pitchFamily="18" charset="0"/>
-              </a:rPr>
-              <a:t>our</a:t>
-            </a:r>
-            <a:r>
-              <a:rPr lang="et-EE" sz="2000" dirty="0" smtClean="0">
+              <a:rPr lang="et-EE" sz="2000" dirty="0" err="1">
+                <a:solidFill>
+                  <a:schemeClr val="accent5">
+                    <a:lumMod val="50000"/>
+                  </a:schemeClr>
+                </a:solidFill>
+                <a:latin typeface="Times New Roman" panose="02020603050405020304" pitchFamily="18" charset="0"/>
+                <a:cs typeface="Times New Roman" panose="02020603050405020304" pitchFamily="18" charset="0"/>
+              </a:rPr>
+              <a:t>this</a:t>
+            </a:r>
+            <a:r>
+              <a:rPr lang="et-EE" sz="2000" dirty="0">
                 <a:solidFill>
                   <a:schemeClr val="accent5">
                     <a:lumMod val="50000"/>
@@ -14698,43 +15490,19 @@
               <a:t> </a:t>
             </a:r>
             <a:r>
-              <a:rPr lang="et-EE" sz="2000" dirty="0" err="1" smtClean="0">
-                <a:solidFill>
-                  <a:schemeClr val="accent5">
-                    <a:lumMod val="50000"/>
-                  </a:schemeClr>
-                </a:solidFill>
-                <a:latin typeface="Times New Roman" panose="02020603050405020304" pitchFamily="18" charset="0"/>
-                <a:cs typeface="Times New Roman" panose="02020603050405020304" pitchFamily="18" charset="0"/>
-              </a:rPr>
-              <a:t>goal</a:t>
-            </a:r>
-            <a:r>
-              <a:rPr lang="et-EE" sz="2000" dirty="0" smtClean="0">
-                <a:solidFill>
-                  <a:schemeClr val="accent5">
-                    <a:lumMod val="50000"/>
-                  </a:schemeClr>
-                </a:solidFill>
-                <a:latin typeface="Times New Roman" panose="02020603050405020304" pitchFamily="18" charset="0"/>
-                <a:cs typeface="Times New Roman" panose="02020603050405020304" pitchFamily="18" charset="0"/>
-              </a:rPr>
-              <a:t> of </a:t>
-            </a:r>
-            <a:r>
-              <a:rPr lang="et-EE" sz="2000" dirty="0" err="1" smtClean="0">
-                <a:solidFill>
-                  <a:schemeClr val="accent5">
-                    <a:lumMod val="50000"/>
-                  </a:schemeClr>
-                </a:solidFill>
-                <a:latin typeface="Times New Roman" panose="02020603050405020304" pitchFamily="18" charset="0"/>
-                <a:cs typeface="Times New Roman" panose="02020603050405020304" pitchFamily="18" charset="0"/>
-              </a:rPr>
-              <a:t>being</a:t>
-            </a:r>
-            <a:r>
-              <a:rPr lang="et-EE" sz="2000" dirty="0" smtClean="0">
+              <a:rPr lang="et-EE" sz="2000" dirty="0" err="1">
+                <a:solidFill>
+                  <a:schemeClr val="accent5">
+                    <a:lumMod val="50000"/>
+                  </a:schemeClr>
+                </a:solidFill>
+                <a:latin typeface="Times New Roman" panose="02020603050405020304" pitchFamily="18" charset="0"/>
+                <a:cs typeface="Times New Roman" panose="02020603050405020304" pitchFamily="18" charset="0"/>
+              </a:rPr>
+              <a:t>big</a:t>
+            </a:r>
+            <a:r>
+              <a:rPr lang="et-EE" sz="2000" dirty="0">
                 <a:solidFill>
                   <a:schemeClr val="accent5">
                     <a:lumMod val="50000"/>
@@ -14746,19 +15514,19 @@
               <a:t> </a:t>
             </a:r>
             <a:r>
-              <a:rPr lang="et-EE" sz="2000" dirty="0" err="1" smtClean="0">
-                <a:solidFill>
-                  <a:schemeClr val="accent5">
-                    <a:lumMod val="50000"/>
-                  </a:schemeClr>
-                </a:solidFill>
-                <a:latin typeface="Times New Roman" panose="02020603050405020304" pitchFamily="18" charset="0"/>
-                <a:cs typeface="Times New Roman" panose="02020603050405020304" pitchFamily="18" charset="0"/>
-              </a:rPr>
-              <a:t>able</a:t>
-            </a:r>
-            <a:r>
-              <a:rPr lang="et-EE" sz="2000" dirty="0" smtClean="0">
+              <a:rPr lang="et-EE" sz="2000" dirty="0" err="1">
+                <a:solidFill>
+                  <a:schemeClr val="accent5">
+                    <a:lumMod val="50000"/>
+                  </a:schemeClr>
+                </a:solidFill>
+                <a:latin typeface="Times New Roman" panose="02020603050405020304" pitchFamily="18" charset="0"/>
+                <a:cs typeface="Times New Roman" panose="02020603050405020304" pitchFamily="18" charset="0"/>
+              </a:rPr>
+              <a:t>most</a:t>
+            </a:r>
+            <a:r>
+              <a:rPr lang="et-EE" sz="2000" dirty="0">
                 <a:solidFill>
                   <a:schemeClr val="accent5">
                     <a:lumMod val="50000"/>
@@ -14770,7 +15538,127 @@
               <a:t> </a:t>
             </a:r>
             <a:r>
-              <a:rPr lang="et-EE" sz="2000" dirty="0" err="1" smtClean="0">
+              <a:rPr lang="et-EE" sz="2000" dirty="0" err="1">
+                <a:solidFill>
+                  <a:schemeClr val="accent5">
+                    <a:lumMod val="50000"/>
+                  </a:schemeClr>
+                </a:solidFill>
+                <a:latin typeface="Times New Roman" panose="02020603050405020304" pitchFamily="18" charset="0"/>
+                <a:cs typeface="Times New Roman" panose="02020603050405020304" pitchFamily="18" charset="0"/>
+              </a:rPr>
+              <a:t>classic</a:t>
+            </a:r>
+            <a:r>
+              <a:rPr lang="et-EE" sz="2000" dirty="0">
+                <a:solidFill>
+                  <a:schemeClr val="accent5">
+                    <a:lumMod val="50000"/>
+                  </a:schemeClr>
+                </a:solidFill>
+                <a:latin typeface="Times New Roman" panose="02020603050405020304" pitchFamily="18" charset="0"/>
+                <a:cs typeface="Times New Roman" panose="02020603050405020304" pitchFamily="18" charset="0"/>
+              </a:rPr>
+              <a:t> </a:t>
+            </a:r>
+            <a:r>
+              <a:rPr lang="et-EE" sz="2000" dirty="0" err="1">
+                <a:solidFill>
+                  <a:schemeClr val="accent5">
+                    <a:lumMod val="50000"/>
+                  </a:schemeClr>
+                </a:solidFill>
+                <a:latin typeface="Times New Roman" panose="02020603050405020304" pitchFamily="18" charset="0"/>
+                <a:cs typeface="Times New Roman" panose="02020603050405020304" pitchFamily="18" charset="0"/>
+              </a:rPr>
+              <a:t>classifiers</a:t>
+            </a:r>
+            <a:r>
+              <a:rPr lang="et-EE" sz="2000" dirty="0">
+                <a:solidFill>
+                  <a:schemeClr val="accent5">
+                    <a:lumMod val="50000"/>
+                  </a:schemeClr>
+                </a:solidFill>
+                <a:latin typeface="Times New Roman" panose="02020603050405020304" pitchFamily="18" charset="0"/>
+                <a:cs typeface="Times New Roman" panose="02020603050405020304" pitchFamily="18" charset="0"/>
+              </a:rPr>
+              <a:t> are </a:t>
+            </a:r>
+            <a:r>
+              <a:rPr lang="et-EE" sz="2000" dirty="0" err="1">
+                <a:solidFill>
+                  <a:schemeClr val="accent5">
+                    <a:lumMod val="50000"/>
+                  </a:schemeClr>
+                </a:solidFill>
+                <a:latin typeface="Times New Roman" panose="02020603050405020304" pitchFamily="18" charset="0"/>
+                <a:cs typeface="Times New Roman" panose="02020603050405020304" pitchFamily="18" charset="0"/>
+              </a:rPr>
+              <a:t>extremely</a:t>
+            </a:r>
+            <a:r>
+              <a:rPr lang="et-EE" sz="2000" dirty="0">
+                <a:solidFill>
+                  <a:schemeClr val="accent5">
+                    <a:lumMod val="50000"/>
+                  </a:schemeClr>
+                </a:solidFill>
+                <a:latin typeface="Times New Roman" panose="02020603050405020304" pitchFamily="18" charset="0"/>
+                <a:cs typeface="Times New Roman" panose="02020603050405020304" pitchFamily="18" charset="0"/>
+              </a:rPr>
+              <a:t> </a:t>
+            </a:r>
+            <a:r>
+              <a:rPr lang="et-EE" sz="2000" dirty="0" err="1">
+                <a:solidFill>
+                  <a:schemeClr val="accent5">
+                    <a:lumMod val="50000"/>
+                  </a:schemeClr>
+                </a:solidFill>
+                <a:latin typeface="Times New Roman" panose="02020603050405020304" pitchFamily="18" charset="0"/>
+                <a:cs typeface="Times New Roman" panose="02020603050405020304" pitchFamily="18" charset="0"/>
+              </a:rPr>
+              <a:t>time</a:t>
+            </a:r>
+            <a:r>
+              <a:rPr lang="et-EE" sz="2000" dirty="0">
+                <a:solidFill>
+                  <a:schemeClr val="accent5">
+                    <a:lumMod val="50000"/>
+                  </a:schemeClr>
+                </a:solidFill>
+                <a:latin typeface="Times New Roman" panose="02020603050405020304" pitchFamily="18" charset="0"/>
+                <a:cs typeface="Times New Roman" panose="02020603050405020304" pitchFamily="18" charset="0"/>
+              </a:rPr>
+              <a:t> </a:t>
+            </a:r>
+            <a:r>
+              <a:rPr lang="et-EE" sz="2000" dirty="0" err="1">
+                <a:solidFill>
+                  <a:schemeClr val="accent5">
+                    <a:lumMod val="50000"/>
+                  </a:schemeClr>
+                </a:solidFill>
+                <a:latin typeface="Times New Roman" panose="02020603050405020304" pitchFamily="18" charset="0"/>
+                <a:cs typeface="Times New Roman" panose="02020603050405020304" pitchFamily="18" charset="0"/>
+              </a:rPr>
+              <a:t>consuming</a:t>
+            </a:r>
+            <a:r>
+              <a:rPr lang="et-EE" sz="2000" dirty="0">
+                <a:solidFill>
+                  <a:schemeClr val="accent5">
+                    <a:lumMod val="50000"/>
+                  </a:schemeClr>
+                </a:solidFill>
+                <a:latin typeface="Times New Roman" panose="02020603050405020304" pitchFamily="18" charset="0"/>
+                <a:cs typeface="Times New Roman" panose="02020603050405020304" pitchFamily="18" charset="0"/>
+              </a:rPr>
+              <a:t> </a:t>
+            </a:r>
+            <a:r>
+              <a:rPr lang="et-EE" sz="2000" dirty="0" err="1">
                 <a:solidFill>
                   <a:schemeClr val="accent5">
                     <a:lumMod val="50000"/>
@@ -14782,7 +15670,7 @@
               <a:t>to</a:t>
             </a:r>
             <a:r>
-              <a:rPr lang="et-EE" sz="2000" dirty="0" smtClean="0">
+              <a:rPr lang="et-EE" sz="2000" dirty="0">
                 <a:solidFill>
                   <a:schemeClr val="accent5">
                     <a:lumMod val="50000"/>
@@ -14794,451 +15682,19 @@
               <a:t> </a:t>
             </a:r>
             <a:r>
-              <a:rPr lang="et-EE" sz="2000" dirty="0" err="1" smtClean="0">
-                <a:solidFill>
-                  <a:schemeClr val="accent5">
-                    <a:lumMod val="50000"/>
-                  </a:schemeClr>
-                </a:solidFill>
-                <a:latin typeface="Times New Roman" panose="02020603050405020304" pitchFamily="18" charset="0"/>
-                <a:cs typeface="Times New Roman" panose="02020603050405020304" pitchFamily="18" charset="0"/>
-              </a:rPr>
-              <a:t>predict</a:t>
-            </a:r>
-            <a:r>
-              <a:rPr lang="et-EE" sz="2000" dirty="0" smtClean="0">
-                <a:solidFill>
-                  <a:schemeClr val="accent5">
-                    <a:lumMod val="50000"/>
-                  </a:schemeClr>
-                </a:solidFill>
-                <a:latin typeface="Times New Roman" panose="02020603050405020304" pitchFamily="18" charset="0"/>
-                <a:cs typeface="Times New Roman" panose="02020603050405020304" pitchFamily="18" charset="0"/>
-              </a:rPr>
-              <a:t> </a:t>
-            </a:r>
-            <a:r>
-              <a:rPr lang="et-EE" sz="2000" dirty="0" err="1" smtClean="0">
-                <a:solidFill>
-                  <a:schemeClr val="accent5">
-                    <a:lumMod val="50000"/>
-                  </a:schemeClr>
-                </a:solidFill>
-                <a:latin typeface="Times New Roman" panose="02020603050405020304" pitchFamily="18" charset="0"/>
-                <a:cs typeface="Times New Roman" panose="02020603050405020304" pitchFamily="18" charset="0"/>
-              </a:rPr>
-              <a:t>accurately</a:t>
-            </a:r>
-            <a:r>
-              <a:rPr lang="et-EE" sz="2000" dirty="0" smtClean="0">
-                <a:solidFill>
-                  <a:schemeClr val="accent5">
-                    <a:lumMod val="50000"/>
-                  </a:schemeClr>
-                </a:solidFill>
-                <a:latin typeface="Times New Roman" panose="02020603050405020304" pitchFamily="18" charset="0"/>
-                <a:cs typeface="Times New Roman" panose="02020603050405020304" pitchFamily="18" charset="0"/>
-              </a:rPr>
-              <a:t> </a:t>
-            </a:r>
-            <a:r>
-              <a:rPr lang="en-GB" sz="2000" dirty="0" smtClean="0">
-                <a:solidFill>
-                  <a:schemeClr val="accent5">
-                    <a:lumMod val="50000"/>
-                  </a:schemeClr>
-                </a:solidFill>
-                <a:latin typeface="Times New Roman" panose="02020603050405020304" pitchFamily="18" charset="0"/>
-                <a:cs typeface="Times New Roman" panose="02020603050405020304" pitchFamily="18" charset="0"/>
-              </a:rPr>
-              <a:t>whether</a:t>
-            </a:r>
-            <a:r>
-              <a:rPr lang="et-EE" sz="2000" dirty="0" smtClean="0">
-                <a:solidFill>
-                  <a:schemeClr val="accent5">
-                    <a:lumMod val="50000"/>
-                  </a:schemeClr>
-                </a:solidFill>
-                <a:latin typeface="Times New Roman" panose="02020603050405020304" pitchFamily="18" charset="0"/>
-                <a:cs typeface="Times New Roman" panose="02020603050405020304" pitchFamily="18" charset="0"/>
-              </a:rPr>
-              <a:t> a </a:t>
-            </a:r>
-            <a:r>
-              <a:rPr lang="et-EE" sz="2000" dirty="0" err="1" smtClean="0">
-                <a:solidFill>
-                  <a:schemeClr val="accent5">
-                    <a:lumMod val="50000"/>
-                  </a:schemeClr>
-                </a:solidFill>
-                <a:latin typeface="Times New Roman" panose="02020603050405020304" pitchFamily="18" charset="0"/>
-                <a:cs typeface="Times New Roman" panose="02020603050405020304" pitchFamily="18" charset="0"/>
-              </a:rPr>
-              <a:t>Kickstarter</a:t>
-            </a:r>
-            <a:r>
-              <a:rPr lang="et-EE" sz="2000" dirty="0" smtClean="0">
-                <a:solidFill>
-                  <a:schemeClr val="accent5">
-                    <a:lumMod val="50000"/>
-                  </a:schemeClr>
-                </a:solidFill>
-                <a:latin typeface="Times New Roman" panose="02020603050405020304" pitchFamily="18" charset="0"/>
-                <a:cs typeface="Times New Roman" panose="02020603050405020304" pitchFamily="18" charset="0"/>
-              </a:rPr>
-              <a:t> </a:t>
-            </a:r>
-            <a:r>
-              <a:rPr lang="et-EE" sz="2000" dirty="0" err="1" smtClean="0">
-                <a:solidFill>
-                  <a:schemeClr val="accent5">
-                    <a:lumMod val="50000"/>
-                  </a:schemeClr>
-                </a:solidFill>
-                <a:latin typeface="Times New Roman" panose="02020603050405020304" pitchFamily="18" charset="0"/>
-                <a:cs typeface="Times New Roman" panose="02020603050405020304" pitchFamily="18" charset="0"/>
-              </a:rPr>
-              <a:t>project</a:t>
-            </a:r>
-            <a:r>
-              <a:rPr lang="et-EE" sz="2000" dirty="0" smtClean="0">
-                <a:solidFill>
-                  <a:schemeClr val="accent5">
-                    <a:lumMod val="50000"/>
-                  </a:schemeClr>
-                </a:solidFill>
-                <a:latin typeface="Times New Roman" panose="02020603050405020304" pitchFamily="18" charset="0"/>
-                <a:cs typeface="Times New Roman" panose="02020603050405020304" pitchFamily="18" charset="0"/>
-              </a:rPr>
-              <a:t> </a:t>
-            </a:r>
-            <a:r>
-              <a:rPr lang="et-EE" sz="2000" dirty="0" err="1" smtClean="0">
-                <a:solidFill>
-                  <a:schemeClr val="accent5">
-                    <a:lumMod val="50000"/>
-                  </a:schemeClr>
-                </a:solidFill>
-                <a:latin typeface="Times New Roman" panose="02020603050405020304" pitchFamily="18" charset="0"/>
-                <a:cs typeface="Times New Roman" panose="02020603050405020304" pitchFamily="18" charset="0"/>
-              </a:rPr>
-              <a:t>will</a:t>
-            </a:r>
-            <a:r>
-              <a:rPr lang="et-EE" sz="2000" dirty="0" smtClean="0">
-                <a:solidFill>
-                  <a:schemeClr val="accent5">
-                    <a:lumMod val="50000"/>
-                  </a:schemeClr>
-                </a:solidFill>
-                <a:latin typeface="Times New Roman" panose="02020603050405020304" pitchFamily="18" charset="0"/>
-                <a:cs typeface="Times New Roman" panose="02020603050405020304" pitchFamily="18" charset="0"/>
-              </a:rPr>
-              <a:t> </a:t>
-            </a:r>
-            <a:r>
-              <a:rPr lang="et-EE" sz="2000" dirty="0" err="1" smtClean="0">
-                <a:solidFill>
-                  <a:schemeClr val="accent5">
-                    <a:lumMod val="50000"/>
-                  </a:schemeClr>
-                </a:solidFill>
-                <a:latin typeface="Times New Roman" panose="02020603050405020304" pitchFamily="18" charset="0"/>
-                <a:cs typeface="Times New Roman" panose="02020603050405020304" pitchFamily="18" charset="0"/>
-              </a:rPr>
-              <a:t>succeed</a:t>
-            </a:r>
-            <a:r>
-              <a:rPr lang="et-EE" sz="2000" dirty="0" smtClean="0">
-                <a:solidFill>
-                  <a:schemeClr val="accent5">
-                    <a:lumMod val="50000"/>
-                  </a:schemeClr>
-                </a:solidFill>
-                <a:latin typeface="Times New Roman" panose="02020603050405020304" pitchFamily="18" charset="0"/>
-                <a:cs typeface="Times New Roman" panose="02020603050405020304" pitchFamily="18" charset="0"/>
-              </a:rPr>
-              <a:t> </a:t>
-            </a:r>
-            <a:r>
-              <a:rPr lang="et-EE" sz="2000" dirty="0" err="1" smtClean="0">
-                <a:solidFill>
-                  <a:schemeClr val="accent5">
-                    <a:lumMod val="50000"/>
-                  </a:schemeClr>
-                </a:solidFill>
-                <a:latin typeface="Times New Roman" panose="02020603050405020304" pitchFamily="18" charset="0"/>
-                <a:cs typeface="Times New Roman" panose="02020603050405020304" pitchFamily="18" charset="0"/>
-              </a:rPr>
-              <a:t>or</a:t>
-            </a:r>
-            <a:r>
-              <a:rPr lang="et-EE" sz="2000" dirty="0" smtClean="0">
-                <a:solidFill>
-                  <a:schemeClr val="accent5">
-                    <a:lumMod val="50000"/>
-                  </a:schemeClr>
-                </a:solidFill>
-                <a:latin typeface="Times New Roman" panose="02020603050405020304" pitchFamily="18" charset="0"/>
-                <a:cs typeface="Times New Roman" panose="02020603050405020304" pitchFamily="18" charset="0"/>
-              </a:rPr>
-              <a:t> fail, </a:t>
-            </a:r>
-            <a:r>
-              <a:rPr lang="et-EE" sz="2000" dirty="0" err="1" smtClean="0">
-                <a:solidFill>
-                  <a:schemeClr val="accent5">
-                    <a:lumMod val="50000"/>
-                  </a:schemeClr>
-                </a:solidFill>
-                <a:latin typeface="Times New Roman" panose="02020603050405020304" pitchFamily="18" charset="0"/>
-                <a:cs typeface="Times New Roman" panose="02020603050405020304" pitchFamily="18" charset="0"/>
-              </a:rPr>
-              <a:t>but</a:t>
-            </a:r>
-            <a:r>
-              <a:rPr lang="et-EE" sz="2000" dirty="0" smtClean="0">
-                <a:solidFill>
-                  <a:schemeClr val="accent5">
-                    <a:lumMod val="50000"/>
-                  </a:schemeClr>
-                </a:solidFill>
-                <a:latin typeface="Times New Roman" panose="02020603050405020304" pitchFamily="18" charset="0"/>
-                <a:cs typeface="Times New Roman" panose="02020603050405020304" pitchFamily="18" charset="0"/>
-              </a:rPr>
-              <a:t> </a:t>
-            </a:r>
-            <a:r>
-              <a:rPr lang="et-EE" sz="2000" dirty="0" err="1" smtClean="0">
-                <a:solidFill>
-                  <a:schemeClr val="accent5">
-                    <a:lumMod val="50000"/>
-                  </a:schemeClr>
-                </a:solidFill>
-                <a:latin typeface="Times New Roman" panose="02020603050405020304" pitchFamily="18" charset="0"/>
-                <a:cs typeface="Times New Roman" panose="02020603050405020304" pitchFamily="18" charset="0"/>
-              </a:rPr>
-              <a:t>we</a:t>
-            </a:r>
-            <a:r>
-              <a:rPr lang="et-EE" sz="2000" dirty="0" smtClean="0">
-                <a:solidFill>
-                  <a:schemeClr val="accent5">
-                    <a:lumMod val="50000"/>
-                  </a:schemeClr>
-                </a:solidFill>
-                <a:latin typeface="Times New Roman" panose="02020603050405020304" pitchFamily="18" charset="0"/>
-                <a:cs typeface="Times New Roman" panose="02020603050405020304" pitchFamily="18" charset="0"/>
-              </a:rPr>
-              <a:t> </a:t>
-            </a:r>
-            <a:r>
-              <a:rPr lang="et-EE" sz="2000" dirty="0" err="1" smtClean="0">
-                <a:solidFill>
-                  <a:schemeClr val="accent5">
-                    <a:lumMod val="50000"/>
-                  </a:schemeClr>
-                </a:solidFill>
-                <a:latin typeface="Times New Roman" panose="02020603050405020304" pitchFamily="18" charset="0"/>
-                <a:cs typeface="Times New Roman" panose="02020603050405020304" pitchFamily="18" charset="0"/>
-              </a:rPr>
-              <a:t>managed</a:t>
-            </a:r>
-            <a:r>
-              <a:rPr lang="et-EE" sz="2000" dirty="0" smtClean="0">
-                <a:solidFill>
-                  <a:schemeClr val="accent5">
-                    <a:lumMod val="50000"/>
-                  </a:schemeClr>
-                </a:solidFill>
-                <a:latin typeface="Times New Roman" panose="02020603050405020304" pitchFamily="18" charset="0"/>
-                <a:cs typeface="Times New Roman" panose="02020603050405020304" pitchFamily="18" charset="0"/>
-              </a:rPr>
-              <a:t> </a:t>
-            </a:r>
-            <a:r>
-              <a:rPr lang="et-EE" sz="2000" dirty="0" err="1" smtClean="0">
-                <a:solidFill>
-                  <a:schemeClr val="accent5">
-                    <a:lumMod val="50000"/>
-                  </a:schemeClr>
-                </a:solidFill>
-                <a:latin typeface="Times New Roman" panose="02020603050405020304" pitchFamily="18" charset="0"/>
-                <a:cs typeface="Times New Roman" panose="02020603050405020304" pitchFamily="18" charset="0"/>
-              </a:rPr>
-              <a:t>to</a:t>
-            </a:r>
-            <a:r>
-              <a:rPr lang="et-EE" sz="2000" dirty="0" smtClean="0">
-                <a:solidFill>
-                  <a:schemeClr val="accent5">
-                    <a:lumMod val="50000"/>
-                  </a:schemeClr>
-                </a:solidFill>
-                <a:latin typeface="Times New Roman" panose="02020603050405020304" pitchFamily="18" charset="0"/>
-                <a:cs typeface="Times New Roman" panose="02020603050405020304" pitchFamily="18" charset="0"/>
-              </a:rPr>
-              <a:t> </a:t>
-            </a:r>
-            <a:r>
-              <a:rPr lang="et-EE" sz="2000" dirty="0" err="1" smtClean="0">
-                <a:solidFill>
-                  <a:schemeClr val="accent5">
-                    <a:lumMod val="50000"/>
-                  </a:schemeClr>
-                </a:solidFill>
-                <a:latin typeface="Times New Roman" panose="02020603050405020304" pitchFamily="18" charset="0"/>
-                <a:cs typeface="Times New Roman" panose="02020603050405020304" pitchFamily="18" charset="0"/>
-              </a:rPr>
-              <a:t>find</a:t>
-            </a:r>
-            <a:r>
-              <a:rPr lang="et-EE" sz="2000" dirty="0" smtClean="0">
-                <a:solidFill>
-                  <a:schemeClr val="accent5">
-                    <a:lumMod val="50000"/>
-                  </a:schemeClr>
-                </a:solidFill>
-                <a:latin typeface="Times New Roman" panose="02020603050405020304" pitchFamily="18" charset="0"/>
-                <a:cs typeface="Times New Roman" panose="02020603050405020304" pitchFamily="18" charset="0"/>
-              </a:rPr>
-              <a:t> </a:t>
-            </a:r>
-            <a:r>
-              <a:rPr lang="et-EE" sz="2000" dirty="0" err="1" smtClean="0">
-                <a:solidFill>
-                  <a:schemeClr val="accent5">
-                    <a:lumMod val="50000"/>
-                  </a:schemeClr>
-                </a:solidFill>
-                <a:latin typeface="Times New Roman" panose="02020603050405020304" pitchFamily="18" charset="0"/>
-                <a:cs typeface="Times New Roman" panose="02020603050405020304" pitchFamily="18" charset="0"/>
-              </a:rPr>
-              <a:t>out</a:t>
-            </a:r>
-            <a:r>
-              <a:rPr lang="et-EE" sz="2000" dirty="0" smtClean="0">
-                <a:solidFill>
-                  <a:schemeClr val="accent5">
-                    <a:lumMod val="50000"/>
-                  </a:schemeClr>
-                </a:solidFill>
-                <a:latin typeface="Times New Roman" panose="02020603050405020304" pitchFamily="18" charset="0"/>
-                <a:cs typeface="Times New Roman" panose="02020603050405020304" pitchFamily="18" charset="0"/>
-              </a:rPr>
-              <a:t> </a:t>
-            </a:r>
-            <a:r>
-              <a:rPr lang="et-EE" sz="2000" dirty="0" err="1" smtClean="0">
-                <a:solidFill>
-                  <a:schemeClr val="accent5">
-                    <a:lumMod val="50000"/>
-                  </a:schemeClr>
-                </a:solidFill>
-                <a:latin typeface="Times New Roman" panose="02020603050405020304" pitchFamily="18" charset="0"/>
-                <a:cs typeface="Times New Roman" panose="02020603050405020304" pitchFamily="18" charset="0"/>
-              </a:rPr>
-              <a:t>some</a:t>
-            </a:r>
-            <a:r>
-              <a:rPr lang="et-EE" sz="2000" dirty="0" smtClean="0">
-                <a:solidFill>
-                  <a:schemeClr val="accent5">
-                    <a:lumMod val="50000"/>
-                  </a:schemeClr>
-                </a:solidFill>
-                <a:latin typeface="Times New Roman" panose="02020603050405020304" pitchFamily="18" charset="0"/>
-                <a:cs typeface="Times New Roman" panose="02020603050405020304" pitchFamily="18" charset="0"/>
-              </a:rPr>
-              <a:t> </a:t>
-            </a:r>
-            <a:r>
-              <a:rPr lang="et-EE" sz="2000" dirty="0" err="1" smtClean="0">
-                <a:solidFill>
-                  <a:schemeClr val="accent5">
-                    <a:lumMod val="50000"/>
-                  </a:schemeClr>
-                </a:solidFill>
-                <a:latin typeface="Times New Roman" panose="02020603050405020304" pitchFamily="18" charset="0"/>
-                <a:cs typeface="Times New Roman" panose="02020603050405020304" pitchFamily="18" charset="0"/>
-              </a:rPr>
-              <a:t>key</a:t>
-            </a:r>
-            <a:r>
-              <a:rPr lang="et-EE" sz="2000" dirty="0" smtClean="0">
-                <a:solidFill>
-                  <a:schemeClr val="accent5">
-                    <a:lumMod val="50000"/>
-                  </a:schemeClr>
-                </a:solidFill>
-                <a:latin typeface="Times New Roman" panose="02020603050405020304" pitchFamily="18" charset="0"/>
-                <a:cs typeface="Times New Roman" panose="02020603050405020304" pitchFamily="18" charset="0"/>
-              </a:rPr>
-              <a:t> </a:t>
-            </a:r>
-            <a:r>
-              <a:rPr lang="et-EE" sz="2000" dirty="0" err="1" smtClean="0">
-                <a:solidFill>
-                  <a:schemeClr val="accent5">
-                    <a:lumMod val="50000"/>
-                  </a:schemeClr>
-                </a:solidFill>
-                <a:latin typeface="Times New Roman" panose="02020603050405020304" pitchFamily="18" charset="0"/>
-                <a:cs typeface="Times New Roman" panose="02020603050405020304" pitchFamily="18" charset="0"/>
-              </a:rPr>
-              <a:t>elements</a:t>
-            </a:r>
-            <a:r>
-              <a:rPr lang="et-EE" sz="2000" dirty="0" smtClean="0">
-                <a:solidFill>
-                  <a:schemeClr val="accent5">
-                    <a:lumMod val="50000"/>
-                  </a:schemeClr>
-                </a:solidFill>
-                <a:latin typeface="Times New Roman" panose="02020603050405020304" pitchFamily="18" charset="0"/>
-                <a:cs typeface="Times New Roman" panose="02020603050405020304" pitchFamily="18" charset="0"/>
-              </a:rPr>
-              <a:t> of a </a:t>
-            </a:r>
-            <a:r>
-              <a:rPr lang="et-EE" sz="2000" dirty="0" err="1" smtClean="0">
-                <a:solidFill>
-                  <a:schemeClr val="accent5">
-                    <a:lumMod val="50000"/>
-                  </a:schemeClr>
-                </a:solidFill>
-                <a:latin typeface="Times New Roman" panose="02020603050405020304" pitchFamily="18" charset="0"/>
-                <a:cs typeface="Times New Roman" panose="02020603050405020304" pitchFamily="18" charset="0"/>
-              </a:rPr>
-              <a:t>good</a:t>
-            </a:r>
-            <a:r>
-              <a:rPr lang="et-EE" sz="2000" dirty="0" smtClean="0">
-                <a:solidFill>
-                  <a:schemeClr val="accent5">
-                    <a:lumMod val="50000"/>
-                  </a:schemeClr>
-                </a:solidFill>
-                <a:latin typeface="Times New Roman" panose="02020603050405020304" pitchFamily="18" charset="0"/>
-                <a:cs typeface="Times New Roman" panose="02020603050405020304" pitchFamily="18" charset="0"/>
-              </a:rPr>
-              <a:t> </a:t>
-            </a:r>
-            <a:r>
-              <a:rPr lang="et-EE" sz="2000" dirty="0" err="1" smtClean="0">
-                <a:solidFill>
-                  <a:schemeClr val="accent5">
-                    <a:lumMod val="50000"/>
-                  </a:schemeClr>
-                </a:solidFill>
-                <a:latin typeface="Times New Roman" panose="02020603050405020304" pitchFamily="18" charset="0"/>
-                <a:cs typeface="Times New Roman" panose="02020603050405020304" pitchFamily="18" charset="0"/>
-              </a:rPr>
-              <a:t>project</a:t>
-            </a:r>
-            <a:r>
-              <a:rPr lang="et-EE" sz="2000" dirty="0" smtClean="0">
+              <a:rPr lang="et-EE" sz="2000" dirty="0" err="1">
+                <a:solidFill>
+                  <a:schemeClr val="accent5">
+                    <a:lumMod val="50000"/>
+                  </a:schemeClr>
+                </a:solidFill>
+                <a:latin typeface="Times New Roman" panose="02020603050405020304" pitchFamily="18" charset="0"/>
+                <a:cs typeface="Times New Roman" panose="02020603050405020304" pitchFamily="18" charset="0"/>
+              </a:rPr>
+              <a:t>run</a:t>
+            </a:r>
+            <a:r>
+              <a:rPr lang="et-EE" sz="2000" dirty="0">
                 <a:solidFill>
                   <a:schemeClr val="accent5">
                     <a:lumMod val="50000"/>
@@ -15249,711 +15705,6 @@
               </a:rPr>
               <a:t>. </a:t>
             </a:r>
-            <a:r>
-              <a:rPr lang="et-EE" sz="2000" dirty="0" err="1" smtClean="0">
-                <a:solidFill>
-                  <a:schemeClr val="accent5">
-                    <a:lumMod val="50000"/>
-                  </a:schemeClr>
-                </a:solidFill>
-                <a:latin typeface="Times New Roman" panose="02020603050405020304" pitchFamily="18" charset="0"/>
-                <a:cs typeface="Times New Roman" panose="02020603050405020304" pitchFamily="18" charset="0"/>
-              </a:rPr>
-              <a:t>We</a:t>
-            </a:r>
-            <a:r>
-              <a:rPr lang="et-EE" sz="2000" dirty="0" smtClean="0">
-                <a:solidFill>
-                  <a:schemeClr val="accent5">
-                    <a:lumMod val="50000"/>
-                  </a:schemeClr>
-                </a:solidFill>
-                <a:latin typeface="Times New Roman" panose="02020603050405020304" pitchFamily="18" charset="0"/>
-                <a:cs typeface="Times New Roman" panose="02020603050405020304" pitchFamily="18" charset="0"/>
-              </a:rPr>
-              <a:t> </a:t>
-            </a:r>
-            <a:r>
-              <a:rPr lang="et-EE" sz="2000" dirty="0" err="1" smtClean="0">
-                <a:solidFill>
-                  <a:schemeClr val="accent5">
-                    <a:lumMod val="50000"/>
-                  </a:schemeClr>
-                </a:solidFill>
-                <a:latin typeface="Times New Roman" panose="02020603050405020304" pitchFamily="18" charset="0"/>
-                <a:cs typeface="Times New Roman" panose="02020603050405020304" pitchFamily="18" charset="0"/>
-              </a:rPr>
-              <a:t>got</a:t>
-            </a:r>
-            <a:r>
-              <a:rPr lang="et-EE" sz="2000" dirty="0" smtClean="0">
-                <a:solidFill>
-                  <a:schemeClr val="accent5">
-                    <a:lumMod val="50000"/>
-                  </a:schemeClr>
-                </a:solidFill>
-                <a:latin typeface="Times New Roman" panose="02020603050405020304" pitchFamily="18" charset="0"/>
-                <a:cs typeface="Times New Roman" panose="02020603050405020304" pitchFamily="18" charset="0"/>
-              </a:rPr>
-              <a:t> </a:t>
-            </a:r>
-            <a:r>
-              <a:rPr lang="et-EE" sz="2000" dirty="0" err="1" smtClean="0">
-                <a:solidFill>
-                  <a:schemeClr val="accent5">
-                    <a:lumMod val="50000"/>
-                  </a:schemeClr>
-                </a:solidFill>
-                <a:latin typeface="Times New Roman" panose="02020603050405020304" pitchFamily="18" charset="0"/>
-                <a:cs typeface="Times New Roman" panose="02020603050405020304" pitchFamily="18" charset="0"/>
-              </a:rPr>
-              <a:t>our</a:t>
-            </a:r>
-            <a:r>
-              <a:rPr lang="et-EE" sz="2000" dirty="0" smtClean="0">
-                <a:solidFill>
-                  <a:schemeClr val="accent5">
-                    <a:lumMod val="50000"/>
-                  </a:schemeClr>
-                </a:solidFill>
-                <a:latin typeface="Times New Roman" panose="02020603050405020304" pitchFamily="18" charset="0"/>
-                <a:cs typeface="Times New Roman" panose="02020603050405020304" pitchFamily="18" charset="0"/>
-              </a:rPr>
-              <a:t> </a:t>
-            </a:r>
-            <a:r>
-              <a:rPr lang="et-EE" sz="2000" dirty="0" err="1" smtClean="0">
-                <a:solidFill>
-                  <a:schemeClr val="accent5">
-                    <a:lumMod val="50000"/>
-                  </a:schemeClr>
-                </a:solidFill>
-                <a:latin typeface="Times New Roman" panose="02020603050405020304" pitchFamily="18" charset="0"/>
-                <a:cs typeface="Times New Roman" panose="02020603050405020304" pitchFamily="18" charset="0"/>
-              </a:rPr>
-              <a:t>predictions</a:t>
-            </a:r>
-            <a:r>
-              <a:rPr lang="et-EE" sz="2000" dirty="0" smtClean="0">
-                <a:solidFill>
-                  <a:schemeClr val="accent5">
-                    <a:lumMod val="50000"/>
-                  </a:schemeClr>
-                </a:solidFill>
-                <a:latin typeface="Times New Roman" panose="02020603050405020304" pitchFamily="18" charset="0"/>
-                <a:cs typeface="Times New Roman" panose="02020603050405020304" pitchFamily="18" charset="0"/>
-              </a:rPr>
-              <a:t> </a:t>
-            </a:r>
-            <a:r>
-              <a:rPr lang="et-EE" sz="2000" dirty="0" err="1" smtClean="0">
-                <a:solidFill>
-                  <a:schemeClr val="accent5">
-                    <a:lumMod val="50000"/>
-                  </a:schemeClr>
-                </a:solidFill>
-                <a:latin typeface="Times New Roman" panose="02020603050405020304" pitchFamily="18" charset="0"/>
-                <a:cs typeface="Times New Roman" panose="02020603050405020304" pitchFamily="18" charset="0"/>
-              </a:rPr>
-              <a:t>up</a:t>
-            </a:r>
-            <a:r>
-              <a:rPr lang="et-EE" sz="2000" dirty="0" smtClean="0">
-                <a:solidFill>
-                  <a:schemeClr val="accent5">
-                    <a:lumMod val="50000"/>
-                  </a:schemeClr>
-                </a:solidFill>
-                <a:latin typeface="Times New Roman" panose="02020603050405020304" pitchFamily="18" charset="0"/>
-                <a:cs typeface="Times New Roman" panose="02020603050405020304" pitchFamily="18" charset="0"/>
-              </a:rPr>
-              <a:t> </a:t>
-            </a:r>
-            <a:r>
-              <a:rPr lang="et-EE" sz="2000" dirty="0" err="1" smtClean="0">
-                <a:solidFill>
-                  <a:schemeClr val="accent5">
-                    <a:lumMod val="50000"/>
-                  </a:schemeClr>
-                </a:solidFill>
-                <a:latin typeface="Times New Roman" panose="02020603050405020304" pitchFamily="18" charset="0"/>
-                <a:cs typeface="Times New Roman" panose="02020603050405020304" pitchFamily="18" charset="0"/>
-              </a:rPr>
-              <a:t>to</a:t>
-            </a:r>
-            <a:r>
-              <a:rPr lang="et-EE" sz="2000" dirty="0" smtClean="0">
-                <a:solidFill>
-                  <a:schemeClr val="accent5">
-                    <a:lumMod val="50000"/>
-                  </a:schemeClr>
-                </a:solidFill>
-                <a:latin typeface="Times New Roman" panose="02020603050405020304" pitchFamily="18" charset="0"/>
-                <a:cs typeface="Times New Roman" panose="02020603050405020304" pitchFamily="18" charset="0"/>
-              </a:rPr>
-              <a:t> 70 % </a:t>
-            </a:r>
-            <a:r>
-              <a:rPr lang="et-EE" sz="2000" dirty="0" err="1" smtClean="0">
-                <a:solidFill>
-                  <a:schemeClr val="accent5">
-                    <a:lumMod val="50000"/>
-                  </a:schemeClr>
-                </a:solidFill>
-                <a:latin typeface="Times New Roman" panose="02020603050405020304" pitchFamily="18" charset="0"/>
-                <a:cs typeface="Times New Roman" panose="02020603050405020304" pitchFamily="18" charset="0"/>
-              </a:rPr>
-              <a:t>accuracy</a:t>
-            </a:r>
-            <a:r>
-              <a:rPr lang="et-EE" sz="2000" dirty="0" smtClean="0">
-                <a:solidFill>
-                  <a:schemeClr val="accent5">
-                    <a:lumMod val="50000"/>
-                  </a:schemeClr>
-                </a:solidFill>
-                <a:latin typeface="Times New Roman" panose="02020603050405020304" pitchFamily="18" charset="0"/>
-                <a:cs typeface="Times New Roman" panose="02020603050405020304" pitchFamily="18" charset="0"/>
-              </a:rPr>
-              <a:t> </a:t>
-            </a:r>
-            <a:r>
-              <a:rPr lang="et-EE" sz="2000" dirty="0" err="1" smtClean="0">
-                <a:solidFill>
-                  <a:schemeClr val="accent5">
-                    <a:lumMod val="50000"/>
-                  </a:schemeClr>
-                </a:solidFill>
-                <a:latin typeface="Times New Roman" panose="02020603050405020304" pitchFamily="18" charset="0"/>
-                <a:cs typeface="Times New Roman" panose="02020603050405020304" pitchFamily="18" charset="0"/>
-              </a:rPr>
-              <a:t>with</a:t>
-            </a:r>
-            <a:r>
-              <a:rPr lang="et-EE" sz="2000" dirty="0" smtClean="0">
-                <a:solidFill>
-                  <a:schemeClr val="accent5">
-                    <a:lumMod val="50000"/>
-                  </a:schemeClr>
-                </a:solidFill>
-                <a:latin typeface="Times New Roman" panose="02020603050405020304" pitchFamily="18" charset="0"/>
-                <a:cs typeface="Times New Roman" panose="02020603050405020304" pitchFamily="18" charset="0"/>
-              </a:rPr>
-              <a:t> </a:t>
-            </a:r>
-            <a:r>
-              <a:rPr lang="et-EE" sz="2000" dirty="0" err="1" smtClean="0">
-                <a:solidFill>
-                  <a:schemeClr val="accent5">
-                    <a:lumMod val="50000"/>
-                  </a:schemeClr>
-                </a:solidFill>
-                <a:latin typeface="Times New Roman" panose="02020603050405020304" pitchFamily="18" charset="0"/>
-                <a:cs typeface="Times New Roman" panose="02020603050405020304" pitchFamily="18" charset="0"/>
-              </a:rPr>
-              <a:t>project</a:t>
-            </a:r>
-            <a:r>
-              <a:rPr lang="et-EE" sz="2000" dirty="0" smtClean="0">
-                <a:solidFill>
-                  <a:schemeClr val="accent5">
-                    <a:lumMod val="50000"/>
-                  </a:schemeClr>
-                </a:solidFill>
-                <a:latin typeface="Times New Roman" panose="02020603050405020304" pitchFamily="18" charset="0"/>
-                <a:cs typeface="Times New Roman" panose="02020603050405020304" pitchFamily="18" charset="0"/>
-              </a:rPr>
-              <a:t> </a:t>
-            </a:r>
-            <a:r>
-              <a:rPr lang="et-EE" sz="2000" dirty="0" err="1" smtClean="0">
-                <a:solidFill>
-                  <a:schemeClr val="accent5">
-                    <a:lumMod val="50000"/>
-                  </a:schemeClr>
-                </a:solidFill>
-                <a:latin typeface="Times New Roman" panose="02020603050405020304" pitchFamily="18" charset="0"/>
-                <a:cs typeface="Times New Roman" panose="02020603050405020304" pitchFamily="18" charset="0"/>
-              </a:rPr>
-              <a:t>category</a:t>
-            </a:r>
-            <a:r>
-              <a:rPr lang="et-EE" sz="2000" dirty="0" smtClean="0">
-                <a:solidFill>
-                  <a:schemeClr val="accent5">
-                    <a:lumMod val="50000"/>
-                  </a:schemeClr>
-                </a:solidFill>
-                <a:latin typeface="Times New Roman" panose="02020603050405020304" pitchFamily="18" charset="0"/>
-                <a:cs typeface="Times New Roman" panose="02020603050405020304" pitchFamily="18" charset="0"/>
-              </a:rPr>
-              <a:t> </a:t>
-            </a:r>
-            <a:r>
-              <a:rPr lang="et-EE" sz="2000" dirty="0" err="1" smtClean="0">
-                <a:solidFill>
-                  <a:schemeClr val="accent5">
-                    <a:lumMod val="50000"/>
-                  </a:schemeClr>
-                </a:solidFill>
-                <a:latin typeface="Times New Roman" panose="02020603050405020304" pitchFamily="18" charset="0"/>
-                <a:cs typeface="Times New Roman" panose="02020603050405020304" pitchFamily="18" charset="0"/>
-              </a:rPr>
-              <a:t>as</a:t>
-            </a:r>
-            <a:r>
-              <a:rPr lang="et-EE" sz="2000" dirty="0" smtClean="0">
-                <a:solidFill>
-                  <a:schemeClr val="accent5">
-                    <a:lumMod val="50000"/>
-                  </a:schemeClr>
-                </a:solidFill>
-                <a:latin typeface="Times New Roman" panose="02020603050405020304" pitchFamily="18" charset="0"/>
-                <a:cs typeface="Times New Roman" panose="02020603050405020304" pitchFamily="18" charset="0"/>
-              </a:rPr>
-              <a:t> </a:t>
-            </a:r>
-            <a:r>
-              <a:rPr lang="et-EE" sz="2000" dirty="0" err="1" smtClean="0">
-                <a:solidFill>
-                  <a:schemeClr val="accent5">
-                    <a:lumMod val="50000"/>
-                  </a:schemeClr>
-                </a:solidFill>
-                <a:latin typeface="Times New Roman" panose="02020603050405020304" pitchFamily="18" charset="0"/>
-                <a:cs typeface="Times New Roman" panose="02020603050405020304" pitchFamily="18" charset="0"/>
-              </a:rPr>
-              <a:t>the</a:t>
-            </a:r>
-            <a:r>
-              <a:rPr lang="et-EE" sz="2000" dirty="0" smtClean="0">
-                <a:solidFill>
-                  <a:schemeClr val="accent5">
-                    <a:lumMod val="50000"/>
-                  </a:schemeClr>
-                </a:solidFill>
-                <a:latin typeface="Times New Roman" panose="02020603050405020304" pitchFamily="18" charset="0"/>
-                <a:cs typeface="Times New Roman" panose="02020603050405020304" pitchFamily="18" charset="0"/>
-              </a:rPr>
-              <a:t> </a:t>
-            </a:r>
-            <a:r>
-              <a:rPr lang="et-EE" sz="2000" dirty="0" err="1" smtClean="0">
-                <a:solidFill>
-                  <a:schemeClr val="accent5">
-                    <a:lumMod val="50000"/>
-                  </a:schemeClr>
-                </a:solidFill>
-                <a:latin typeface="Times New Roman" panose="02020603050405020304" pitchFamily="18" charset="0"/>
-                <a:cs typeface="Times New Roman" panose="02020603050405020304" pitchFamily="18" charset="0"/>
-              </a:rPr>
-              <a:t>only</a:t>
-            </a:r>
-            <a:r>
-              <a:rPr lang="et-EE" sz="2000" dirty="0" smtClean="0">
-                <a:solidFill>
-                  <a:schemeClr val="accent5">
-                    <a:lumMod val="50000"/>
-                  </a:schemeClr>
-                </a:solidFill>
-                <a:latin typeface="Times New Roman" panose="02020603050405020304" pitchFamily="18" charset="0"/>
-                <a:cs typeface="Times New Roman" panose="02020603050405020304" pitchFamily="18" charset="0"/>
-              </a:rPr>
-              <a:t> </a:t>
-            </a:r>
-            <a:r>
-              <a:rPr lang="et-EE" sz="2000" dirty="0" err="1" smtClean="0">
-                <a:solidFill>
-                  <a:schemeClr val="accent5">
-                    <a:lumMod val="50000"/>
-                  </a:schemeClr>
-                </a:solidFill>
-                <a:latin typeface="Times New Roman" panose="02020603050405020304" pitchFamily="18" charset="0"/>
-                <a:cs typeface="Times New Roman" panose="02020603050405020304" pitchFamily="18" charset="0"/>
-              </a:rPr>
-              <a:t>feature</a:t>
-            </a:r>
-            <a:r>
-              <a:rPr lang="et-EE" sz="2000" dirty="0" smtClean="0">
-                <a:solidFill>
-                  <a:schemeClr val="accent5">
-                    <a:lumMod val="50000"/>
-                  </a:schemeClr>
-                </a:solidFill>
-                <a:latin typeface="Times New Roman" panose="02020603050405020304" pitchFamily="18" charset="0"/>
-                <a:cs typeface="Times New Roman" panose="02020603050405020304" pitchFamily="18" charset="0"/>
-              </a:rPr>
-              <a:t>. </a:t>
-            </a:r>
-            <a:r>
-              <a:rPr lang="et-EE" sz="2000" dirty="0" err="1" smtClean="0">
-                <a:solidFill>
-                  <a:schemeClr val="accent5">
-                    <a:lumMod val="50000"/>
-                  </a:schemeClr>
-                </a:solidFill>
-                <a:latin typeface="Times New Roman" panose="02020603050405020304" pitchFamily="18" charset="0"/>
-                <a:cs typeface="Times New Roman" panose="02020603050405020304" pitchFamily="18" charset="0"/>
-              </a:rPr>
-              <a:t>We</a:t>
-            </a:r>
-            <a:r>
-              <a:rPr lang="et-EE" sz="2000" dirty="0" smtClean="0">
-                <a:solidFill>
-                  <a:schemeClr val="accent5">
-                    <a:lumMod val="50000"/>
-                  </a:schemeClr>
-                </a:solidFill>
-                <a:latin typeface="Times New Roman" panose="02020603050405020304" pitchFamily="18" charset="0"/>
-                <a:cs typeface="Times New Roman" panose="02020603050405020304" pitchFamily="18" charset="0"/>
-              </a:rPr>
-              <a:t> </a:t>
-            </a:r>
-            <a:r>
-              <a:rPr lang="et-EE" sz="2000" dirty="0" err="1" smtClean="0">
-                <a:solidFill>
-                  <a:schemeClr val="accent5">
-                    <a:lumMod val="50000"/>
-                  </a:schemeClr>
-                </a:solidFill>
-                <a:latin typeface="Times New Roman" panose="02020603050405020304" pitchFamily="18" charset="0"/>
-                <a:cs typeface="Times New Roman" panose="02020603050405020304" pitchFamily="18" charset="0"/>
-              </a:rPr>
-              <a:t>also</a:t>
-            </a:r>
-            <a:r>
-              <a:rPr lang="et-EE" sz="2000" dirty="0" smtClean="0">
-                <a:solidFill>
-                  <a:schemeClr val="accent5">
-                    <a:lumMod val="50000"/>
-                  </a:schemeClr>
-                </a:solidFill>
-                <a:latin typeface="Times New Roman" panose="02020603050405020304" pitchFamily="18" charset="0"/>
-                <a:cs typeface="Times New Roman" panose="02020603050405020304" pitchFamily="18" charset="0"/>
-              </a:rPr>
-              <a:t> </a:t>
-            </a:r>
-            <a:r>
-              <a:rPr lang="et-EE" sz="2000" dirty="0" err="1" smtClean="0">
-                <a:solidFill>
-                  <a:schemeClr val="accent5">
-                    <a:lumMod val="50000"/>
-                  </a:schemeClr>
-                </a:solidFill>
-                <a:latin typeface="Times New Roman" panose="02020603050405020304" pitchFamily="18" charset="0"/>
-                <a:cs typeface="Times New Roman" panose="02020603050405020304" pitchFamily="18" charset="0"/>
-              </a:rPr>
-              <a:t>found</a:t>
-            </a:r>
-            <a:r>
-              <a:rPr lang="et-EE" sz="2000" dirty="0" smtClean="0">
-                <a:solidFill>
-                  <a:schemeClr val="accent5">
-                    <a:lumMod val="50000"/>
-                  </a:schemeClr>
-                </a:solidFill>
-                <a:latin typeface="Times New Roman" panose="02020603050405020304" pitchFamily="18" charset="0"/>
-                <a:cs typeface="Times New Roman" panose="02020603050405020304" pitchFamily="18" charset="0"/>
-              </a:rPr>
-              <a:t> </a:t>
-            </a:r>
-            <a:r>
-              <a:rPr lang="et-EE" sz="2000" dirty="0" err="1" smtClean="0">
-                <a:solidFill>
-                  <a:schemeClr val="accent5">
-                    <a:lumMod val="50000"/>
-                  </a:schemeClr>
-                </a:solidFill>
-                <a:latin typeface="Times New Roman" panose="02020603050405020304" pitchFamily="18" charset="0"/>
-                <a:cs typeface="Times New Roman" panose="02020603050405020304" pitchFamily="18" charset="0"/>
-              </a:rPr>
-              <a:t>that</a:t>
-            </a:r>
-            <a:r>
-              <a:rPr lang="et-EE" sz="2000" dirty="0" smtClean="0">
-                <a:solidFill>
-                  <a:schemeClr val="accent5">
-                    <a:lumMod val="50000"/>
-                  </a:schemeClr>
-                </a:solidFill>
-                <a:latin typeface="Times New Roman" panose="02020603050405020304" pitchFamily="18" charset="0"/>
-                <a:cs typeface="Times New Roman" panose="02020603050405020304" pitchFamily="18" charset="0"/>
-              </a:rPr>
-              <a:t> on a </a:t>
-            </a:r>
-            <a:r>
-              <a:rPr lang="et-EE" sz="2000" dirty="0" err="1" smtClean="0">
-                <a:solidFill>
-                  <a:schemeClr val="accent5">
-                    <a:lumMod val="50000"/>
-                  </a:schemeClr>
-                </a:solidFill>
-                <a:latin typeface="Times New Roman" panose="02020603050405020304" pitchFamily="18" charset="0"/>
-                <a:cs typeface="Times New Roman" panose="02020603050405020304" pitchFamily="18" charset="0"/>
-              </a:rPr>
-              <a:t>dataset</a:t>
-            </a:r>
-            <a:r>
-              <a:rPr lang="et-EE" sz="2000" dirty="0" smtClean="0">
-                <a:solidFill>
-                  <a:schemeClr val="accent5">
-                    <a:lumMod val="50000"/>
-                  </a:schemeClr>
-                </a:solidFill>
-                <a:latin typeface="Times New Roman" panose="02020603050405020304" pitchFamily="18" charset="0"/>
-                <a:cs typeface="Times New Roman" panose="02020603050405020304" pitchFamily="18" charset="0"/>
-              </a:rPr>
-              <a:t> </a:t>
-            </a:r>
-            <a:r>
-              <a:rPr lang="et-EE" sz="2000" dirty="0" err="1" smtClean="0">
-                <a:solidFill>
-                  <a:schemeClr val="accent5">
-                    <a:lumMod val="50000"/>
-                  </a:schemeClr>
-                </a:solidFill>
-                <a:latin typeface="Times New Roman" panose="02020603050405020304" pitchFamily="18" charset="0"/>
-                <a:cs typeface="Times New Roman" panose="02020603050405020304" pitchFamily="18" charset="0"/>
-              </a:rPr>
-              <a:t>this</a:t>
-            </a:r>
-            <a:r>
-              <a:rPr lang="et-EE" sz="2000" dirty="0" smtClean="0">
-                <a:solidFill>
-                  <a:schemeClr val="accent5">
-                    <a:lumMod val="50000"/>
-                  </a:schemeClr>
-                </a:solidFill>
-                <a:latin typeface="Times New Roman" panose="02020603050405020304" pitchFamily="18" charset="0"/>
-                <a:cs typeface="Times New Roman" panose="02020603050405020304" pitchFamily="18" charset="0"/>
-              </a:rPr>
-              <a:t> </a:t>
-            </a:r>
-            <a:r>
-              <a:rPr lang="et-EE" sz="2000" dirty="0" err="1" smtClean="0">
-                <a:solidFill>
-                  <a:schemeClr val="accent5">
-                    <a:lumMod val="50000"/>
-                  </a:schemeClr>
-                </a:solidFill>
-                <a:latin typeface="Times New Roman" panose="02020603050405020304" pitchFamily="18" charset="0"/>
-                <a:cs typeface="Times New Roman" panose="02020603050405020304" pitchFamily="18" charset="0"/>
-              </a:rPr>
-              <a:t>big</a:t>
-            </a:r>
-            <a:r>
-              <a:rPr lang="et-EE" sz="2000" dirty="0" smtClean="0">
-                <a:solidFill>
-                  <a:schemeClr val="accent5">
-                    <a:lumMod val="50000"/>
-                  </a:schemeClr>
-                </a:solidFill>
-                <a:latin typeface="Times New Roman" panose="02020603050405020304" pitchFamily="18" charset="0"/>
-                <a:cs typeface="Times New Roman" panose="02020603050405020304" pitchFamily="18" charset="0"/>
-              </a:rPr>
-              <a:t> </a:t>
-            </a:r>
-            <a:r>
-              <a:rPr lang="et-EE" sz="2000" dirty="0" err="1" smtClean="0">
-                <a:solidFill>
-                  <a:schemeClr val="accent5">
-                    <a:lumMod val="50000"/>
-                  </a:schemeClr>
-                </a:solidFill>
-                <a:latin typeface="Times New Roman" panose="02020603050405020304" pitchFamily="18" charset="0"/>
-                <a:cs typeface="Times New Roman" panose="02020603050405020304" pitchFamily="18" charset="0"/>
-              </a:rPr>
-              <a:t>most</a:t>
-            </a:r>
-            <a:r>
-              <a:rPr lang="et-EE" sz="2000" dirty="0" smtClean="0">
-                <a:solidFill>
-                  <a:schemeClr val="accent5">
-                    <a:lumMod val="50000"/>
-                  </a:schemeClr>
-                </a:solidFill>
-                <a:latin typeface="Times New Roman" panose="02020603050405020304" pitchFamily="18" charset="0"/>
-                <a:cs typeface="Times New Roman" panose="02020603050405020304" pitchFamily="18" charset="0"/>
-              </a:rPr>
-              <a:t> </a:t>
-            </a:r>
-            <a:r>
-              <a:rPr lang="et-EE" sz="2000" dirty="0" err="1" smtClean="0">
-                <a:solidFill>
-                  <a:schemeClr val="accent5">
-                    <a:lumMod val="50000"/>
-                  </a:schemeClr>
-                </a:solidFill>
-                <a:latin typeface="Times New Roman" panose="02020603050405020304" pitchFamily="18" charset="0"/>
-                <a:cs typeface="Times New Roman" panose="02020603050405020304" pitchFamily="18" charset="0"/>
-              </a:rPr>
-              <a:t>classic</a:t>
-            </a:r>
-            <a:r>
-              <a:rPr lang="et-EE" sz="2000" dirty="0" smtClean="0">
-                <a:solidFill>
-                  <a:schemeClr val="accent5">
-                    <a:lumMod val="50000"/>
-                  </a:schemeClr>
-                </a:solidFill>
-                <a:latin typeface="Times New Roman" panose="02020603050405020304" pitchFamily="18" charset="0"/>
-                <a:cs typeface="Times New Roman" panose="02020603050405020304" pitchFamily="18" charset="0"/>
-              </a:rPr>
-              <a:t> </a:t>
-            </a:r>
-            <a:r>
-              <a:rPr lang="et-EE" sz="2000" dirty="0" err="1" smtClean="0">
-                <a:solidFill>
-                  <a:schemeClr val="accent5">
-                    <a:lumMod val="50000"/>
-                  </a:schemeClr>
-                </a:solidFill>
-                <a:latin typeface="Times New Roman" panose="02020603050405020304" pitchFamily="18" charset="0"/>
-                <a:cs typeface="Times New Roman" panose="02020603050405020304" pitchFamily="18" charset="0"/>
-              </a:rPr>
-              <a:t>classifiers</a:t>
-            </a:r>
-            <a:r>
-              <a:rPr lang="et-EE" sz="2000" dirty="0" smtClean="0">
-                <a:solidFill>
-                  <a:schemeClr val="accent5">
-                    <a:lumMod val="50000"/>
-                  </a:schemeClr>
-                </a:solidFill>
-                <a:latin typeface="Times New Roman" panose="02020603050405020304" pitchFamily="18" charset="0"/>
-                <a:cs typeface="Times New Roman" panose="02020603050405020304" pitchFamily="18" charset="0"/>
-              </a:rPr>
-              <a:t> are </a:t>
-            </a:r>
-            <a:r>
-              <a:rPr lang="et-EE" sz="2000" dirty="0" err="1" smtClean="0">
-                <a:solidFill>
-                  <a:schemeClr val="accent5">
-                    <a:lumMod val="50000"/>
-                  </a:schemeClr>
-                </a:solidFill>
-                <a:latin typeface="Times New Roman" panose="02020603050405020304" pitchFamily="18" charset="0"/>
-                <a:cs typeface="Times New Roman" panose="02020603050405020304" pitchFamily="18" charset="0"/>
-              </a:rPr>
-              <a:t>extremely</a:t>
-            </a:r>
-            <a:r>
-              <a:rPr lang="et-EE" sz="2000" dirty="0" smtClean="0">
-                <a:solidFill>
-                  <a:schemeClr val="accent5">
-                    <a:lumMod val="50000"/>
-                  </a:schemeClr>
-                </a:solidFill>
-                <a:latin typeface="Times New Roman" panose="02020603050405020304" pitchFamily="18" charset="0"/>
-                <a:cs typeface="Times New Roman" panose="02020603050405020304" pitchFamily="18" charset="0"/>
-              </a:rPr>
-              <a:t> </a:t>
-            </a:r>
-            <a:r>
-              <a:rPr lang="et-EE" sz="2000" dirty="0" err="1" smtClean="0">
-                <a:solidFill>
-                  <a:schemeClr val="accent5">
-                    <a:lumMod val="50000"/>
-                  </a:schemeClr>
-                </a:solidFill>
-                <a:latin typeface="Times New Roman" panose="02020603050405020304" pitchFamily="18" charset="0"/>
-                <a:cs typeface="Times New Roman" panose="02020603050405020304" pitchFamily="18" charset="0"/>
-              </a:rPr>
-              <a:t>time</a:t>
-            </a:r>
-            <a:r>
-              <a:rPr lang="et-EE" sz="2000" dirty="0" smtClean="0">
-                <a:solidFill>
-                  <a:schemeClr val="accent5">
-                    <a:lumMod val="50000"/>
-                  </a:schemeClr>
-                </a:solidFill>
-                <a:latin typeface="Times New Roman" panose="02020603050405020304" pitchFamily="18" charset="0"/>
-                <a:cs typeface="Times New Roman" panose="02020603050405020304" pitchFamily="18" charset="0"/>
-              </a:rPr>
-              <a:t> </a:t>
-            </a:r>
-            <a:r>
-              <a:rPr lang="et-EE" sz="2000" dirty="0" err="1" smtClean="0">
-                <a:solidFill>
-                  <a:schemeClr val="accent5">
-                    <a:lumMod val="50000"/>
-                  </a:schemeClr>
-                </a:solidFill>
-                <a:latin typeface="Times New Roman" panose="02020603050405020304" pitchFamily="18" charset="0"/>
-                <a:cs typeface="Times New Roman" panose="02020603050405020304" pitchFamily="18" charset="0"/>
-              </a:rPr>
-              <a:t>consuming</a:t>
-            </a:r>
-            <a:r>
-              <a:rPr lang="et-EE" sz="2000" dirty="0" smtClean="0">
-                <a:solidFill>
-                  <a:schemeClr val="accent5">
-                    <a:lumMod val="50000"/>
-                  </a:schemeClr>
-                </a:solidFill>
-                <a:latin typeface="Times New Roman" panose="02020603050405020304" pitchFamily="18" charset="0"/>
-                <a:cs typeface="Times New Roman" panose="02020603050405020304" pitchFamily="18" charset="0"/>
-              </a:rPr>
-              <a:t> </a:t>
-            </a:r>
-            <a:r>
-              <a:rPr lang="et-EE" sz="2000" dirty="0" err="1" smtClean="0">
-                <a:solidFill>
-                  <a:schemeClr val="accent5">
-                    <a:lumMod val="50000"/>
-                  </a:schemeClr>
-                </a:solidFill>
-                <a:latin typeface="Times New Roman" panose="02020603050405020304" pitchFamily="18" charset="0"/>
-                <a:cs typeface="Times New Roman" panose="02020603050405020304" pitchFamily="18" charset="0"/>
-              </a:rPr>
-              <a:t>to</a:t>
-            </a:r>
-            <a:r>
-              <a:rPr lang="et-EE" sz="2000" dirty="0" smtClean="0">
-                <a:solidFill>
-                  <a:schemeClr val="accent5">
-                    <a:lumMod val="50000"/>
-                  </a:schemeClr>
-                </a:solidFill>
-                <a:latin typeface="Times New Roman" panose="02020603050405020304" pitchFamily="18" charset="0"/>
-                <a:cs typeface="Times New Roman" panose="02020603050405020304" pitchFamily="18" charset="0"/>
-              </a:rPr>
-              <a:t> </a:t>
-            </a:r>
-            <a:r>
-              <a:rPr lang="et-EE" sz="2000" dirty="0" err="1" smtClean="0">
-                <a:solidFill>
-                  <a:schemeClr val="accent5">
-                    <a:lumMod val="50000"/>
-                  </a:schemeClr>
-                </a:solidFill>
-                <a:latin typeface="Times New Roman" panose="02020603050405020304" pitchFamily="18" charset="0"/>
-                <a:cs typeface="Times New Roman" panose="02020603050405020304" pitchFamily="18" charset="0"/>
-              </a:rPr>
-              <a:t>run</a:t>
-            </a:r>
-            <a:r>
-              <a:rPr lang="et-EE" sz="2000" dirty="0" smtClean="0">
-                <a:solidFill>
-                  <a:schemeClr val="accent5">
-                    <a:lumMod val="50000"/>
-                  </a:schemeClr>
-                </a:solidFill>
-                <a:latin typeface="Times New Roman" panose="02020603050405020304" pitchFamily="18" charset="0"/>
-                <a:cs typeface="Times New Roman" panose="02020603050405020304" pitchFamily="18" charset="0"/>
-              </a:rPr>
-              <a:t>. </a:t>
-            </a:r>
-            <a:endParaRPr lang="et-EE" sz="2000" dirty="0">
-              <a:solidFill>
-                <a:schemeClr val="accent5">
-                  <a:lumMod val="50000"/>
-                </a:schemeClr>
-              </a:solidFill>
-              <a:latin typeface="Times New Roman" panose="02020603050405020304" pitchFamily="18" charset="0"/>
-              <a:cs typeface="Times New Roman" panose="02020603050405020304" pitchFamily="18" charset="0"/>
-            </a:endParaRPr>
           </a:p>
         </p:txBody>
       </p:sp>
@@ -16209,13 +15960,8 @@
           <a:p>
             <a:r>
               <a:rPr lang="et-EE" dirty="0" smtClean="0"/>
-              <a:t>MACHINE </a:t>
-            </a:r>
-            <a:r>
-              <a:rPr lang="et-EE" dirty="0" smtClean="0"/>
-              <a:t>LEARNING</a:t>
-            </a:r>
-            <a:endParaRPr lang="et-EE" dirty="0" smtClean="0"/>
+              <a:t>MACHINE LEARNING</a:t>
+            </a:r>
           </a:p>
         </p:txBody>
       </p:sp>
@@ -16346,7 +16092,103 @@
                 <a:latin typeface="Times New Roman" panose="02020603050405020304" pitchFamily="18" charset="0"/>
                 <a:cs typeface="Times New Roman" panose="02020603050405020304" pitchFamily="18" charset="0"/>
               </a:rPr>
-              <a:t>Month the project is launched also played an important role in the outcome. Project that is launched in March has higher chance at succeeding. July was almost the only month that reduced the projects likelihood of being successful.</a:t>
+              <a:t>Month the project is launched also played an important role in the outcome. </a:t>
+            </a:r>
+            <a:r>
+              <a:rPr lang="et-EE" sz="2000" dirty="0" smtClean="0">
+                <a:solidFill>
+                  <a:schemeClr val="accent5">
+                    <a:lumMod val="50000"/>
+                  </a:schemeClr>
+                </a:solidFill>
+                <a:latin typeface="Times New Roman" panose="02020603050405020304" pitchFamily="18" charset="0"/>
+                <a:cs typeface="Times New Roman" panose="02020603050405020304" pitchFamily="18" charset="0"/>
+              </a:rPr>
+              <a:t>A p</a:t>
+            </a:r>
+            <a:r>
+              <a:rPr lang="en-US" sz="2000" dirty="0" err="1" smtClean="0">
+                <a:solidFill>
+                  <a:schemeClr val="accent5">
+                    <a:lumMod val="50000"/>
+                  </a:schemeClr>
+                </a:solidFill>
+                <a:latin typeface="Times New Roman" panose="02020603050405020304" pitchFamily="18" charset="0"/>
+                <a:cs typeface="Times New Roman" panose="02020603050405020304" pitchFamily="18" charset="0"/>
+              </a:rPr>
+              <a:t>roject</a:t>
+            </a:r>
+            <a:r>
+              <a:rPr lang="en-US" sz="2000" dirty="0" smtClean="0">
+                <a:solidFill>
+                  <a:schemeClr val="accent5">
+                    <a:lumMod val="50000"/>
+                  </a:schemeClr>
+                </a:solidFill>
+                <a:latin typeface="Times New Roman" panose="02020603050405020304" pitchFamily="18" charset="0"/>
+                <a:cs typeface="Times New Roman" panose="02020603050405020304" pitchFamily="18" charset="0"/>
+              </a:rPr>
+              <a:t> </a:t>
+            </a:r>
+            <a:r>
+              <a:rPr lang="en-US" sz="2000" dirty="0">
+                <a:solidFill>
+                  <a:schemeClr val="accent5">
+                    <a:lumMod val="50000"/>
+                  </a:schemeClr>
+                </a:solidFill>
+                <a:latin typeface="Times New Roman" panose="02020603050405020304" pitchFamily="18" charset="0"/>
+                <a:cs typeface="Times New Roman" panose="02020603050405020304" pitchFamily="18" charset="0"/>
+              </a:rPr>
+              <a:t>that is launched in March </a:t>
+            </a:r>
+            <a:r>
+              <a:rPr lang="en-US" sz="2000" dirty="0" smtClean="0">
+                <a:solidFill>
+                  <a:schemeClr val="accent5">
+                    <a:lumMod val="50000"/>
+                  </a:schemeClr>
+                </a:solidFill>
+                <a:latin typeface="Times New Roman" panose="02020603050405020304" pitchFamily="18" charset="0"/>
+                <a:cs typeface="Times New Roman" panose="02020603050405020304" pitchFamily="18" charset="0"/>
+              </a:rPr>
+              <a:t>has</a:t>
+            </a:r>
+            <a:r>
+              <a:rPr lang="et-EE" sz="2000" dirty="0" smtClean="0">
+                <a:solidFill>
+                  <a:schemeClr val="accent5">
+                    <a:lumMod val="50000"/>
+                  </a:schemeClr>
+                </a:solidFill>
+                <a:latin typeface="Times New Roman" panose="02020603050405020304" pitchFamily="18" charset="0"/>
+                <a:cs typeface="Times New Roman" panose="02020603050405020304" pitchFamily="18" charset="0"/>
+              </a:rPr>
+              <a:t> a </a:t>
+            </a:r>
+            <a:r>
+              <a:rPr lang="en-US" sz="2000" dirty="0" smtClean="0">
+                <a:solidFill>
+                  <a:schemeClr val="accent5">
+                    <a:lumMod val="50000"/>
+                  </a:schemeClr>
+                </a:solidFill>
+                <a:latin typeface="Times New Roman" panose="02020603050405020304" pitchFamily="18" charset="0"/>
+                <a:cs typeface="Times New Roman" panose="02020603050405020304" pitchFamily="18" charset="0"/>
+              </a:rPr>
+              <a:t>higher </a:t>
+            </a:r>
+            <a:r>
+              <a:rPr lang="en-US" sz="2000" dirty="0">
+                <a:solidFill>
+                  <a:schemeClr val="accent5">
+                    <a:lumMod val="50000"/>
+                  </a:schemeClr>
+                </a:solidFill>
+                <a:latin typeface="Times New Roman" panose="02020603050405020304" pitchFamily="18" charset="0"/>
+                <a:cs typeface="Times New Roman" panose="02020603050405020304" pitchFamily="18" charset="0"/>
+              </a:rPr>
+              <a:t>chance at succeeding. July was almost the only month that reduced the projects likelihood of being successful.</a:t>
             </a:r>
             <a:endParaRPr lang="et-EE" sz="2000" dirty="0">
               <a:solidFill>
@@ -16432,7 +16274,7 @@
         <p:spPr>
           <a:xfrm>
             <a:off x="435417" y="21385460"/>
-            <a:ext cx="4897885" cy="5047536"/>
+            <a:ext cx="4897885" cy="3785652"/>
           </a:xfrm>
           <a:prstGeom prst="rect">
             <a:avLst/>
@@ -16451,7 +16293,7 @@
               </a:spcBef>
             </a:pPr>
             <a:r>
-              <a:rPr lang="et-EE" sz="2300" dirty="0" err="1">
+              <a:rPr lang="et-EE" sz="2000" dirty="0" err="1">
                 <a:solidFill>
                   <a:schemeClr val="accent5">
                     <a:lumMod val="50000"/>
@@ -16463,7 +16305,7 @@
               <a:t>We</a:t>
             </a:r>
             <a:r>
-              <a:rPr lang="et-EE" sz="2300" dirty="0">
+              <a:rPr lang="et-EE" sz="2000" dirty="0">
                 <a:solidFill>
                   <a:schemeClr val="accent5">
                     <a:lumMod val="50000"/>
@@ -16475,7 +16317,7 @@
               <a:t> </a:t>
             </a:r>
             <a:r>
-              <a:rPr lang="et-EE" sz="2300" dirty="0" err="1">
+              <a:rPr lang="et-EE" sz="2000" dirty="0" err="1">
                 <a:solidFill>
                   <a:schemeClr val="accent5">
                     <a:lumMod val="50000"/>
@@ -16487,7 +16329,7 @@
               <a:t>tried</a:t>
             </a:r>
             <a:r>
-              <a:rPr lang="et-EE" sz="2300" dirty="0">
+              <a:rPr lang="et-EE" sz="2000" dirty="0">
                 <a:solidFill>
                   <a:schemeClr val="accent5">
                     <a:lumMod val="50000"/>
@@ -16499,7 +16341,7 @@
               <a:t> </a:t>
             </a:r>
             <a:r>
-              <a:rPr lang="et-EE" sz="2300" dirty="0" err="1">
+              <a:rPr lang="et-EE" sz="2000" dirty="0" err="1">
                 <a:solidFill>
                   <a:schemeClr val="accent5">
                     <a:lumMod val="50000"/>
@@ -16511,7 +16353,7 @@
               <a:t>three</a:t>
             </a:r>
             <a:r>
-              <a:rPr lang="et-EE" sz="2300" dirty="0">
+              <a:rPr lang="et-EE" sz="2000" dirty="0">
                 <a:solidFill>
                   <a:schemeClr val="accent5">
                     <a:lumMod val="50000"/>
@@ -16523,7 +16365,7 @@
               <a:t> </a:t>
             </a:r>
             <a:r>
-              <a:rPr lang="et-EE" sz="2300" dirty="0" err="1">
+              <a:rPr lang="et-EE" sz="2000" dirty="0" err="1">
                 <a:solidFill>
                   <a:schemeClr val="accent5">
                     <a:lumMod val="50000"/>
@@ -16535,7 +16377,7 @@
               <a:t>different</a:t>
             </a:r>
             <a:r>
-              <a:rPr lang="et-EE" sz="2300" dirty="0">
+              <a:rPr lang="et-EE" sz="2000" dirty="0">
                 <a:solidFill>
                   <a:schemeClr val="accent5">
                     <a:lumMod val="50000"/>
@@ -16547,7 +16389,7 @@
               <a:t> </a:t>
             </a:r>
             <a:r>
-              <a:rPr lang="et-EE" sz="2300" dirty="0" err="1">
+              <a:rPr lang="et-EE" sz="2000" dirty="0" err="1">
                 <a:solidFill>
                   <a:schemeClr val="accent5">
                     <a:lumMod val="50000"/>
@@ -16559,7 +16401,7 @@
               <a:t>approaches</a:t>
             </a:r>
             <a:r>
-              <a:rPr lang="et-EE" sz="2300" dirty="0">
+              <a:rPr lang="et-EE" sz="2000" dirty="0">
                 <a:solidFill>
                   <a:schemeClr val="accent5">
                     <a:lumMod val="50000"/>
@@ -16571,7 +16413,7 @@
               <a:t>. </a:t>
             </a:r>
             <a:r>
-              <a:rPr lang="et-EE" sz="2300" dirty="0" err="1">
+              <a:rPr lang="et-EE" sz="2000" dirty="0" err="1">
                 <a:solidFill>
                   <a:schemeClr val="accent5">
                     <a:lumMod val="50000"/>
@@ -16583,7 +16425,7 @@
               <a:t>Firstly</a:t>
             </a:r>
             <a:r>
-              <a:rPr lang="et-EE" sz="2300" dirty="0">
+              <a:rPr lang="et-EE" sz="2000" dirty="0">
                 <a:solidFill>
                   <a:schemeClr val="accent5">
                     <a:lumMod val="50000"/>
@@ -16595,7 +16437,7 @@
               <a:t> </a:t>
             </a:r>
             <a:r>
-              <a:rPr lang="et-EE" sz="2300" dirty="0" err="1">
+              <a:rPr lang="et-EE" sz="2000" dirty="0" err="1">
                 <a:solidFill>
                   <a:schemeClr val="accent5">
                     <a:lumMod val="50000"/>
@@ -16607,7 +16449,7 @@
               <a:t>we</a:t>
             </a:r>
             <a:r>
-              <a:rPr lang="et-EE" sz="2300" dirty="0">
+              <a:rPr lang="et-EE" sz="2000" dirty="0">
                 <a:solidFill>
                   <a:schemeClr val="accent5">
                     <a:lumMod val="50000"/>
@@ -16619,7 +16461,7 @@
               <a:t> </a:t>
             </a:r>
             <a:r>
-              <a:rPr lang="et-EE" sz="2300" dirty="0" err="1">
+              <a:rPr lang="et-EE" sz="2000" dirty="0" err="1">
                 <a:solidFill>
                   <a:schemeClr val="accent5">
                     <a:lumMod val="50000"/>
@@ -16631,7 +16473,7 @@
               <a:t>tried</a:t>
             </a:r>
             <a:r>
-              <a:rPr lang="et-EE" sz="2300" dirty="0">
+              <a:rPr lang="et-EE" sz="2000" dirty="0">
                 <a:solidFill>
                   <a:schemeClr val="accent5">
                     <a:lumMod val="50000"/>
@@ -16643,7 +16485,7 @@
               <a:t> a </a:t>
             </a:r>
             <a:r>
-              <a:rPr lang="et-EE" sz="2300" dirty="0" err="1">
+              <a:rPr lang="et-EE" sz="2000" dirty="0" err="1">
                 <a:solidFill>
                   <a:schemeClr val="accent5">
                     <a:lumMod val="50000"/>
@@ -16655,7 +16497,7 @@
               <a:t>usual</a:t>
             </a:r>
             <a:r>
-              <a:rPr lang="et-EE" sz="2300" dirty="0">
+              <a:rPr lang="et-EE" sz="2000" dirty="0">
                 <a:solidFill>
                   <a:schemeClr val="accent5">
                     <a:lumMod val="50000"/>
@@ -16667,7 +16509,7 @@
               <a:t> </a:t>
             </a:r>
             <a:r>
-              <a:rPr lang="et-EE" sz="2300" dirty="0" err="1">
+              <a:rPr lang="et-EE" sz="2000" dirty="0" err="1">
                 <a:solidFill>
                   <a:schemeClr val="accent5">
                     <a:lumMod val="50000"/>
@@ -16679,7 +16521,7 @@
               <a:t>r</a:t>
             </a:r>
             <a:r>
-              <a:rPr lang="et-EE" sz="2300" dirty="0" err="1" smtClean="0">
+              <a:rPr lang="et-EE" sz="2000" dirty="0" err="1" smtClean="0">
                 <a:solidFill>
                   <a:schemeClr val="accent5">
                     <a:lumMod val="50000"/>
@@ -16691,7 +16533,7 @@
               <a:t>andom</a:t>
             </a:r>
             <a:r>
-              <a:rPr lang="et-EE" sz="2300" dirty="0" smtClean="0">
+              <a:rPr lang="et-EE" sz="2000" dirty="0" smtClean="0">
                 <a:solidFill>
                   <a:schemeClr val="accent5">
                     <a:lumMod val="50000"/>
@@ -16703,7 +16545,7 @@
               <a:t> </a:t>
             </a:r>
             <a:r>
-              <a:rPr lang="et-EE" sz="2300" dirty="0" err="1">
+              <a:rPr lang="et-EE" sz="2000" dirty="0" err="1">
                 <a:solidFill>
                   <a:schemeClr val="accent5">
                     <a:lumMod val="50000"/>
@@ -16715,7 +16557,7 @@
               <a:t>f</a:t>
             </a:r>
             <a:r>
-              <a:rPr lang="et-EE" sz="2300" dirty="0" err="1" smtClean="0">
+              <a:rPr lang="et-EE" sz="2000" dirty="0" err="1" smtClean="0">
                 <a:solidFill>
                   <a:schemeClr val="accent5">
                     <a:lumMod val="50000"/>
@@ -16727,7 +16569,7 @@
               <a:t>orest</a:t>
             </a:r>
             <a:r>
-              <a:rPr lang="et-EE" sz="2300" dirty="0" smtClean="0">
+              <a:rPr lang="et-EE" sz="2000" dirty="0" smtClean="0">
                 <a:solidFill>
                   <a:schemeClr val="accent5">
                     <a:lumMod val="50000"/>
@@ -16739,7 +16581,7 @@
               <a:t> </a:t>
             </a:r>
             <a:r>
-              <a:rPr lang="et-EE" sz="2300" dirty="0" err="1">
+              <a:rPr lang="et-EE" sz="2000" dirty="0" err="1">
                 <a:solidFill>
                   <a:schemeClr val="accent5">
                     <a:lumMod val="50000"/>
@@ -16751,7 +16593,7 @@
               <a:t>c</a:t>
             </a:r>
             <a:r>
-              <a:rPr lang="et-EE" sz="2300" dirty="0" err="1" smtClean="0">
+              <a:rPr lang="et-EE" sz="2000" dirty="0" err="1" smtClean="0">
                 <a:solidFill>
                   <a:schemeClr val="accent5">
                     <a:lumMod val="50000"/>
@@ -16763,7 +16605,7 @@
               <a:t>lassifier</a:t>
             </a:r>
             <a:r>
-              <a:rPr lang="et-EE" sz="2300" dirty="0" smtClean="0">
+              <a:rPr lang="et-EE" sz="2000" dirty="0" smtClean="0">
                 <a:solidFill>
                   <a:schemeClr val="accent5">
                     <a:lumMod val="50000"/>
@@ -16775,7 +16617,7 @@
               <a:t> </a:t>
             </a:r>
             <a:r>
-              <a:rPr lang="et-EE" sz="2300" dirty="0">
+              <a:rPr lang="et-EE" sz="2000" dirty="0">
                 <a:solidFill>
                   <a:schemeClr val="accent5">
                     <a:lumMod val="50000"/>
@@ -16787,7 +16629,7 @@
               <a:t>on </a:t>
             </a:r>
             <a:r>
-              <a:rPr lang="et-EE" sz="2300" dirty="0" err="1">
+              <a:rPr lang="et-EE" sz="2000" dirty="0" err="1">
                 <a:solidFill>
                   <a:schemeClr val="accent5">
                     <a:lumMod val="50000"/>
@@ -16799,7 +16641,7 @@
               <a:t>features</a:t>
             </a:r>
             <a:r>
-              <a:rPr lang="et-EE" sz="2300" dirty="0">
+              <a:rPr lang="et-EE" sz="2000" dirty="0">
                 <a:solidFill>
                   <a:schemeClr val="accent5">
                     <a:lumMod val="50000"/>
@@ -16811,7 +16653,7 @@
               <a:t> </a:t>
             </a:r>
             <a:r>
-              <a:rPr lang="et-EE" sz="2300" dirty="0" err="1">
+              <a:rPr lang="et-EE" sz="2000" dirty="0" err="1">
                 <a:solidFill>
                   <a:schemeClr val="accent5">
                     <a:lumMod val="50000"/>
@@ -16823,7 +16665,7 @@
               <a:t>category</a:t>
             </a:r>
             <a:r>
-              <a:rPr lang="et-EE" sz="2300" dirty="0">
+              <a:rPr lang="et-EE" sz="2000" dirty="0">
                 <a:solidFill>
                   <a:schemeClr val="accent5">
                     <a:lumMod val="50000"/>
@@ -16835,7 +16677,7 @@
               <a:t>, </a:t>
             </a:r>
             <a:r>
-              <a:rPr lang="et-EE" sz="2300" dirty="0" err="1">
+              <a:rPr lang="et-EE" sz="2000" dirty="0" err="1">
                 <a:solidFill>
                   <a:schemeClr val="accent5">
                     <a:lumMod val="50000"/>
@@ -16847,7 +16689,7 @@
               <a:t>main_category</a:t>
             </a:r>
             <a:r>
-              <a:rPr lang="et-EE" sz="2300" dirty="0">
+              <a:rPr lang="et-EE" sz="2000" dirty="0">
                 <a:solidFill>
                   <a:schemeClr val="accent5">
                     <a:lumMod val="50000"/>
@@ -16859,7 +16701,7 @@
               <a:t>, </a:t>
             </a:r>
             <a:r>
-              <a:rPr lang="et-EE" sz="2300" dirty="0" err="1">
+              <a:rPr lang="et-EE" sz="2000" dirty="0" err="1">
                 <a:solidFill>
                   <a:schemeClr val="accent5">
                     <a:lumMod val="50000"/>
@@ -16871,7 +16713,7 @@
               <a:t>currency</a:t>
             </a:r>
             <a:r>
-              <a:rPr lang="et-EE" sz="2300" dirty="0">
+              <a:rPr lang="et-EE" sz="2000" dirty="0">
                 <a:solidFill>
                   <a:schemeClr val="accent5">
                     <a:lumMod val="50000"/>
@@ -16883,7 +16725,7 @@
               <a:t>, </a:t>
             </a:r>
             <a:r>
-              <a:rPr lang="et-EE" sz="2300" dirty="0" err="1">
+              <a:rPr lang="et-EE" sz="2000" dirty="0" err="1">
                 <a:solidFill>
                   <a:schemeClr val="accent5">
                     <a:lumMod val="50000"/>
@@ -16895,7 +16737,7 @@
               <a:t>country</a:t>
             </a:r>
             <a:r>
-              <a:rPr lang="et-EE" sz="2300" dirty="0">
+              <a:rPr lang="et-EE" sz="2000" dirty="0">
                 <a:solidFill>
                   <a:schemeClr val="accent5">
                     <a:lumMod val="50000"/>
@@ -16907,7 +16749,7 @@
               <a:t> and </a:t>
             </a:r>
             <a:r>
-              <a:rPr lang="et-EE" sz="2300" dirty="0" err="1">
+              <a:rPr lang="et-EE" sz="2000" dirty="0" err="1">
                 <a:solidFill>
                   <a:schemeClr val="accent5">
                     <a:lumMod val="50000"/>
@@ -16919,7 +16761,7 @@
               <a:t>usd_goal_real</a:t>
             </a:r>
             <a:r>
-              <a:rPr lang="et-EE" sz="2300" dirty="0">
+              <a:rPr lang="et-EE" sz="2000" dirty="0">
                 <a:solidFill>
                   <a:schemeClr val="accent5">
                     <a:lumMod val="50000"/>
@@ -16931,7 +16773,7 @@
               <a:t>. </a:t>
             </a:r>
             <a:r>
-              <a:rPr lang="et-EE" sz="2300" dirty="0" err="1">
+              <a:rPr lang="et-EE" sz="2000" dirty="0" err="1">
                 <a:solidFill>
                   <a:schemeClr val="accent5">
                     <a:lumMod val="50000"/>
@@ -16943,7 +16785,7 @@
               <a:t>That</a:t>
             </a:r>
             <a:r>
-              <a:rPr lang="et-EE" sz="2300" dirty="0">
+              <a:rPr lang="et-EE" sz="2000" dirty="0">
                 <a:solidFill>
                   <a:schemeClr val="accent5">
                     <a:lumMod val="50000"/>
@@ -16955,7 +16797,7 @@
               <a:t> </a:t>
             </a:r>
             <a:r>
-              <a:rPr lang="et-EE" sz="2300" dirty="0" err="1">
+              <a:rPr lang="et-EE" sz="2000" dirty="0" err="1">
                 <a:solidFill>
                   <a:schemeClr val="accent5">
                     <a:lumMod val="50000"/>
@@ -16967,7 +16809,7 @@
               <a:t>approach</a:t>
             </a:r>
             <a:r>
-              <a:rPr lang="et-EE" sz="2300" dirty="0">
+              <a:rPr lang="et-EE" sz="2000" dirty="0">
                 <a:solidFill>
                   <a:schemeClr val="accent5">
                     <a:lumMod val="50000"/>
@@ -16979,7 +16821,7 @@
               <a:t> </a:t>
             </a:r>
             <a:r>
-              <a:rPr lang="et-EE" sz="2300" dirty="0" err="1">
+              <a:rPr lang="et-EE" sz="2000" dirty="0" err="1">
                 <a:solidFill>
                   <a:schemeClr val="accent5">
                     <a:lumMod val="50000"/>
@@ -16991,7 +16833,7 @@
               <a:t>gave</a:t>
             </a:r>
             <a:r>
-              <a:rPr lang="et-EE" sz="2300" dirty="0">
+              <a:rPr lang="et-EE" sz="2000" dirty="0">
                 <a:solidFill>
                   <a:schemeClr val="accent5">
                     <a:lumMod val="50000"/>
@@ -17003,7 +16845,7 @@
               <a:t> </a:t>
             </a:r>
             <a:r>
-              <a:rPr lang="et-EE" sz="2300" dirty="0" err="1">
+              <a:rPr lang="et-EE" sz="2000" dirty="0" err="1">
                 <a:solidFill>
                   <a:schemeClr val="accent5">
                     <a:lumMod val="50000"/>
@@ -17015,7 +16857,7 @@
               <a:t>an</a:t>
             </a:r>
             <a:r>
-              <a:rPr lang="et-EE" sz="2300" dirty="0">
+              <a:rPr lang="et-EE" sz="2000" dirty="0">
                 <a:solidFill>
                   <a:schemeClr val="accent5">
                     <a:lumMod val="50000"/>
@@ -17027,7 +16869,7 @@
               <a:t> </a:t>
             </a:r>
             <a:r>
-              <a:rPr lang="et-EE" sz="2300" dirty="0" err="1">
+              <a:rPr lang="et-EE" sz="2000" dirty="0" err="1">
                 <a:solidFill>
                   <a:schemeClr val="accent5">
                     <a:lumMod val="50000"/>
@@ -17039,7 +16881,7 @@
               <a:t>accuracy</a:t>
             </a:r>
             <a:r>
-              <a:rPr lang="et-EE" sz="2300" dirty="0">
+              <a:rPr lang="et-EE" sz="2000" dirty="0">
                 <a:solidFill>
                   <a:schemeClr val="accent5">
                     <a:lumMod val="50000"/>
@@ -17051,7 +16893,7 @@
               <a:t> of 66.5 %. </a:t>
             </a:r>
             <a:r>
-              <a:rPr lang="et-EE" sz="2300" dirty="0" err="1">
+              <a:rPr lang="et-EE" sz="2000" dirty="0" err="1">
                 <a:solidFill>
                   <a:schemeClr val="accent5">
                     <a:lumMod val="50000"/>
@@ -17063,7 +16905,7 @@
               <a:t>Next</a:t>
             </a:r>
             <a:r>
-              <a:rPr lang="et-EE" sz="2300" dirty="0">
+              <a:rPr lang="et-EE" sz="2000" dirty="0">
                 <a:solidFill>
                   <a:schemeClr val="accent5">
                     <a:lumMod val="50000"/>
@@ -17075,7 +16917,7 @@
               <a:t> </a:t>
             </a:r>
             <a:r>
-              <a:rPr lang="et-EE" sz="2300" dirty="0" err="1">
+              <a:rPr lang="et-EE" sz="2000" dirty="0" err="1">
                 <a:solidFill>
                   <a:schemeClr val="accent5">
                     <a:lumMod val="50000"/>
@@ -17087,7 +16929,7 @@
               <a:t>we</a:t>
             </a:r>
             <a:r>
-              <a:rPr lang="et-EE" sz="2300" dirty="0">
+              <a:rPr lang="et-EE" sz="2000" dirty="0">
                 <a:solidFill>
                   <a:schemeClr val="accent5">
                     <a:lumMod val="50000"/>
@@ -17099,7 +16941,7 @@
               <a:t> </a:t>
             </a:r>
             <a:r>
-              <a:rPr lang="et-EE" sz="2300" dirty="0" err="1">
+              <a:rPr lang="et-EE" sz="2000" dirty="0" err="1">
                 <a:solidFill>
                   <a:schemeClr val="accent5">
                     <a:lumMod val="50000"/>
@@ -17111,7 +16953,7 @@
               <a:t>tried</a:t>
             </a:r>
             <a:r>
-              <a:rPr lang="et-EE" sz="2300" dirty="0">
+              <a:rPr lang="et-EE" sz="2000" dirty="0">
                 <a:solidFill>
                   <a:schemeClr val="accent5">
                     <a:lumMod val="50000"/>
@@ -17123,7 +16965,7 @@
               <a:t> </a:t>
             </a:r>
             <a:r>
-              <a:rPr lang="et-EE" sz="2300" dirty="0" err="1">
+              <a:rPr lang="et-EE" sz="2000" dirty="0" err="1">
                 <a:solidFill>
                   <a:schemeClr val="accent5">
                     <a:lumMod val="50000"/>
@@ -17135,7 +16977,7 @@
               <a:t>making</a:t>
             </a:r>
             <a:r>
-              <a:rPr lang="et-EE" sz="2300" dirty="0">
+              <a:rPr lang="et-EE" sz="2000" dirty="0">
                 <a:solidFill>
                   <a:schemeClr val="accent5">
                     <a:lumMod val="50000"/>
@@ -17147,7 +16989,7 @@
               <a:t> </a:t>
             </a:r>
             <a:r>
-              <a:rPr lang="et-EE" sz="2300" dirty="0" err="1">
+              <a:rPr lang="et-EE" sz="2000" dirty="0" err="1">
                 <a:solidFill>
                   <a:schemeClr val="accent5">
                     <a:lumMod val="50000"/>
@@ -17159,7 +17001,7 @@
               <a:t>features</a:t>
             </a:r>
             <a:r>
-              <a:rPr lang="et-EE" sz="2300" dirty="0">
+              <a:rPr lang="et-EE" sz="2000" dirty="0">
                 <a:solidFill>
                   <a:schemeClr val="accent5">
                     <a:lumMod val="50000"/>
@@ -17171,7 +17013,7 @@
               <a:t> of </a:t>
             </a:r>
             <a:r>
-              <a:rPr lang="et-EE" sz="2300" dirty="0" err="1">
+              <a:rPr lang="et-EE" sz="2000" dirty="0" err="1">
                 <a:solidFill>
                   <a:schemeClr val="accent5">
                     <a:lumMod val="50000"/>
@@ -17183,7 +17025,7 @@
               <a:t>the</a:t>
             </a:r>
             <a:r>
-              <a:rPr lang="et-EE" sz="2300" dirty="0">
+              <a:rPr lang="et-EE" sz="2000" dirty="0">
                 <a:solidFill>
                   <a:schemeClr val="accent5">
                     <a:lumMod val="50000"/>
@@ -17195,7 +17037,7 @@
               <a:t> </a:t>
             </a:r>
             <a:r>
-              <a:rPr lang="et-EE" sz="2300" dirty="0" err="1">
+              <a:rPr lang="et-EE" sz="2000" dirty="0" err="1">
                 <a:solidFill>
                   <a:schemeClr val="accent5">
                     <a:lumMod val="50000"/>
@@ -17207,7 +17049,7 @@
               <a:t>most</a:t>
             </a:r>
             <a:r>
-              <a:rPr lang="et-EE" sz="2300" dirty="0">
+              <a:rPr lang="et-EE" sz="2000" dirty="0">
                 <a:solidFill>
                   <a:schemeClr val="accent5">
                     <a:lumMod val="50000"/>
@@ -17219,7 +17061,7 @@
               <a:t> </a:t>
             </a:r>
             <a:r>
-              <a:rPr lang="et-EE" sz="2300" dirty="0" err="1">
+              <a:rPr lang="et-EE" sz="2000" dirty="0" err="1">
                 <a:solidFill>
                   <a:schemeClr val="accent5">
                     <a:lumMod val="50000"/>
@@ -17231,7 +17073,7 @@
               <a:t>frequent</a:t>
             </a:r>
             <a:r>
-              <a:rPr lang="et-EE" sz="2300" dirty="0">
+              <a:rPr lang="et-EE" sz="2000" dirty="0">
                 <a:solidFill>
                   <a:schemeClr val="accent5">
                     <a:lumMod val="50000"/>
@@ -17243,7 +17085,7 @@
               <a:t> </a:t>
             </a:r>
             <a:r>
-              <a:rPr lang="et-EE" sz="2300" dirty="0" err="1">
+              <a:rPr lang="et-EE" sz="2000" dirty="0" err="1">
                 <a:solidFill>
                   <a:schemeClr val="accent5">
                     <a:lumMod val="50000"/>
@@ -17255,7 +17097,7 @@
               <a:t>words</a:t>
             </a:r>
             <a:r>
-              <a:rPr lang="et-EE" sz="2300" dirty="0">
+              <a:rPr lang="et-EE" sz="2000" dirty="0">
                 <a:solidFill>
                   <a:schemeClr val="accent5">
                     <a:lumMod val="50000"/>
@@ -17267,7 +17109,7 @@
               <a:t> in </a:t>
             </a:r>
             <a:r>
-              <a:rPr lang="et-EE" sz="2300" dirty="0" err="1">
+              <a:rPr lang="et-EE" sz="2000" dirty="0" err="1">
                 <a:solidFill>
                   <a:schemeClr val="accent5">
                     <a:lumMod val="50000"/>
@@ -17279,7 +17121,7 @@
               <a:t>project</a:t>
             </a:r>
             <a:r>
-              <a:rPr lang="et-EE" sz="2300" dirty="0">
+              <a:rPr lang="et-EE" sz="2000" dirty="0">
                 <a:solidFill>
                   <a:schemeClr val="accent5">
                     <a:lumMod val="50000"/>
@@ -17291,7 +17133,7 @@
               <a:t> </a:t>
             </a:r>
             <a:r>
-              <a:rPr lang="et-EE" sz="2300" dirty="0" err="1">
+              <a:rPr lang="et-EE" sz="2000" dirty="0" err="1">
                 <a:solidFill>
                   <a:schemeClr val="accent5">
                     <a:lumMod val="50000"/>
@@ -17303,7 +17145,7 @@
               <a:t>titles</a:t>
             </a:r>
             <a:r>
-              <a:rPr lang="et-EE" sz="2300" dirty="0">
+              <a:rPr lang="et-EE" sz="2000" dirty="0">
                 <a:solidFill>
                   <a:schemeClr val="accent5">
                     <a:lumMod val="50000"/>
@@ -17315,7 +17157,7 @@
               <a:t> and </a:t>
             </a:r>
             <a:r>
-              <a:rPr lang="et-EE" sz="2300" dirty="0" err="1">
+              <a:rPr lang="et-EE" sz="2000" dirty="0" err="1">
                 <a:solidFill>
                   <a:schemeClr val="accent5">
                     <a:lumMod val="50000"/>
@@ -17327,7 +17169,7 @@
               <a:t>train</a:t>
             </a:r>
             <a:r>
-              <a:rPr lang="et-EE" sz="2300" dirty="0">
+              <a:rPr lang="et-EE" sz="2000" dirty="0">
                 <a:solidFill>
                   <a:schemeClr val="accent5">
                     <a:lumMod val="50000"/>
@@ -17339,7 +17181,7 @@
               <a:t> a </a:t>
             </a:r>
             <a:r>
-              <a:rPr lang="et-EE" sz="2300" dirty="0" err="1">
+              <a:rPr lang="et-EE" sz="2000" dirty="0" err="1">
                 <a:solidFill>
                   <a:schemeClr val="accent5">
                     <a:lumMod val="50000"/>
@@ -17351,7 +17193,7 @@
               <a:t>r</a:t>
             </a:r>
             <a:r>
-              <a:rPr lang="et-EE" sz="2300" dirty="0" err="1" smtClean="0">
+              <a:rPr lang="et-EE" sz="2000" dirty="0" err="1" smtClean="0">
                 <a:solidFill>
                   <a:schemeClr val="accent5">
                     <a:lumMod val="50000"/>
@@ -17363,7 +17205,7 @@
               <a:t>andom</a:t>
             </a:r>
             <a:r>
-              <a:rPr lang="et-EE" sz="2300" dirty="0" smtClean="0">
+              <a:rPr lang="et-EE" sz="2000" dirty="0" smtClean="0">
                 <a:solidFill>
                   <a:schemeClr val="accent5">
                     <a:lumMod val="50000"/>
@@ -17375,7 +17217,7 @@
               <a:t> </a:t>
             </a:r>
             <a:r>
-              <a:rPr lang="et-EE" sz="2300" dirty="0" err="1">
+              <a:rPr lang="et-EE" sz="2000" dirty="0" err="1">
                 <a:solidFill>
                   <a:schemeClr val="accent5">
                     <a:lumMod val="50000"/>
@@ -17387,7 +17229,7 @@
               <a:t>f</a:t>
             </a:r>
             <a:r>
-              <a:rPr lang="et-EE" sz="2300" dirty="0" err="1" smtClean="0">
+              <a:rPr lang="et-EE" sz="2000" dirty="0" err="1" smtClean="0">
                 <a:solidFill>
                   <a:schemeClr val="accent5">
                     <a:lumMod val="50000"/>
@@ -17399,7 +17241,7 @@
               <a:t>orest</a:t>
             </a:r>
             <a:r>
-              <a:rPr lang="et-EE" sz="2300" dirty="0" smtClean="0">
+              <a:rPr lang="et-EE" sz="2000" dirty="0" smtClean="0">
                 <a:solidFill>
                   <a:schemeClr val="accent5">
                     <a:lumMod val="50000"/>
@@ -17411,7 +17253,7 @@
               <a:t> </a:t>
             </a:r>
             <a:r>
-              <a:rPr lang="et-EE" sz="2300" dirty="0" err="1">
+              <a:rPr lang="et-EE" sz="2000" dirty="0" err="1">
                 <a:solidFill>
                   <a:schemeClr val="accent5">
                     <a:lumMod val="50000"/>
@@ -17423,7 +17265,7 @@
               <a:t>c</a:t>
             </a:r>
             <a:r>
-              <a:rPr lang="et-EE" sz="2300" dirty="0" err="1" smtClean="0">
+              <a:rPr lang="et-EE" sz="2000" dirty="0" err="1" smtClean="0">
                 <a:solidFill>
                   <a:schemeClr val="accent5">
                     <a:lumMod val="50000"/>
@@ -17435,7 +17277,7 @@
               <a:t>lassifier</a:t>
             </a:r>
             <a:r>
-              <a:rPr lang="et-EE" sz="2300" dirty="0" smtClean="0">
+              <a:rPr lang="et-EE" sz="2000" dirty="0" smtClean="0">
                 <a:solidFill>
                   <a:schemeClr val="accent5">
                     <a:lumMod val="50000"/>
@@ -17447,7 +17289,7 @@
               <a:t> </a:t>
             </a:r>
             <a:r>
-              <a:rPr lang="et-EE" sz="2300" dirty="0" err="1">
+              <a:rPr lang="et-EE" sz="2000" dirty="0" err="1">
                 <a:solidFill>
                   <a:schemeClr val="accent5">
                     <a:lumMod val="50000"/>
@@ -17459,7 +17301,7 @@
               <a:t>with</a:t>
             </a:r>
             <a:r>
-              <a:rPr lang="et-EE" sz="2300" dirty="0">
+              <a:rPr lang="et-EE" sz="2000" dirty="0">
                 <a:solidFill>
                   <a:schemeClr val="accent5">
                     <a:lumMod val="50000"/>
@@ -17471,7 +17313,7 @@
               <a:t> </a:t>
             </a:r>
             <a:r>
-              <a:rPr lang="et-EE" sz="2300" dirty="0" err="1">
+              <a:rPr lang="et-EE" sz="2000" dirty="0" err="1">
                 <a:solidFill>
                   <a:schemeClr val="accent5">
                     <a:lumMod val="50000"/>
@@ -17483,7 +17325,7 @@
               <a:t>these</a:t>
             </a:r>
             <a:r>
-              <a:rPr lang="et-EE" sz="2300" dirty="0">
+              <a:rPr lang="et-EE" sz="2000" dirty="0">
                 <a:solidFill>
                   <a:schemeClr val="accent5">
                     <a:lumMod val="50000"/>
@@ -17495,7 +17337,7 @@
               <a:t> </a:t>
             </a:r>
             <a:r>
-              <a:rPr lang="et-EE" sz="2300" dirty="0" err="1">
+              <a:rPr lang="et-EE" sz="2000" dirty="0" err="1">
                 <a:solidFill>
                   <a:schemeClr val="accent5">
                     <a:lumMod val="50000"/>
@@ -17507,7 +17349,7 @@
               <a:t>features</a:t>
             </a:r>
             <a:r>
-              <a:rPr lang="et-EE" sz="2300" dirty="0">
+              <a:rPr lang="et-EE" sz="2000" dirty="0">
                 <a:solidFill>
                   <a:schemeClr val="accent5">
                     <a:lumMod val="50000"/>
@@ -17519,7 +17361,7 @@
               <a:t>. </a:t>
             </a:r>
             <a:r>
-              <a:rPr lang="et-EE" sz="2300" dirty="0" err="1">
+              <a:rPr lang="et-EE" sz="2000" dirty="0" err="1">
                 <a:solidFill>
                   <a:schemeClr val="accent5">
                     <a:lumMod val="50000"/>
@@ -17531,7 +17373,7 @@
               <a:t>This</a:t>
             </a:r>
             <a:r>
-              <a:rPr lang="et-EE" sz="2300" dirty="0">
+              <a:rPr lang="et-EE" sz="2000" dirty="0">
                 <a:solidFill>
                   <a:schemeClr val="accent5">
                     <a:lumMod val="50000"/>
@@ -17543,7 +17385,7 @@
               <a:t> </a:t>
             </a:r>
             <a:r>
-              <a:rPr lang="et-EE" sz="2300" dirty="0" err="1">
+              <a:rPr lang="et-EE" sz="2000" dirty="0" err="1">
                 <a:solidFill>
                   <a:schemeClr val="accent5">
                     <a:lumMod val="50000"/>
@@ -17555,7 +17397,7 @@
               <a:t>approach</a:t>
             </a:r>
             <a:r>
-              <a:rPr lang="et-EE" sz="2300" dirty="0">
+              <a:rPr lang="et-EE" sz="2000" dirty="0">
                 <a:solidFill>
                   <a:schemeClr val="accent5">
                     <a:lumMod val="50000"/>
@@ -17567,7 +17409,7 @@
               <a:t> </a:t>
             </a:r>
             <a:r>
-              <a:rPr lang="et-EE" sz="2300" dirty="0" err="1">
+              <a:rPr lang="et-EE" sz="2000" dirty="0" err="1">
                 <a:solidFill>
                   <a:schemeClr val="accent5">
                     <a:lumMod val="50000"/>
@@ -17579,7 +17421,7 @@
               <a:t>gave</a:t>
             </a:r>
             <a:r>
-              <a:rPr lang="et-EE" sz="2300" dirty="0">
+              <a:rPr lang="et-EE" sz="2000" dirty="0">
                 <a:solidFill>
                   <a:schemeClr val="accent5">
                     <a:lumMod val="50000"/>
@@ -17591,7 +17433,7 @@
               <a:t> </a:t>
             </a:r>
             <a:r>
-              <a:rPr lang="et-EE" sz="2300" dirty="0" err="1">
+              <a:rPr lang="et-EE" sz="2000" dirty="0" err="1">
                 <a:solidFill>
                   <a:schemeClr val="accent5">
                     <a:lumMod val="50000"/>
@@ -17603,7 +17445,7 @@
               <a:t>an</a:t>
             </a:r>
             <a:r>
-              <a:rPr lang="et-EE" sz="2300" dirty="0">
+              <a:rPr lang="et-EE" sz="2000" dirty="0">
                 <a:solidFill>
                   <a:schemeClr val="accent5">
                     <a:lumMod val="50000"/>
@@ -17615,7 +17457,7 @@
               <a:t> </a:t>
             </a:r>
             <a:r>
-              <a:rPr lang="et-EE" sz="2300" dirty="0" err="1">
+              <a:rPr lang="et-EE" sz="2000" dirty="0" err="1">
                 <a:solidFill>
                   <a:schemeClr val="accent5">
                     <a:lumMod val="50000"/>
@@ -17627,7 +17469,7 @@
               <a:t>accuracy</a:t>
             </a:r>
             <a:r>
-              <a:rPr lang="et-EE" sz="2300" dirty="0">
+              <a:rPr lang="et-EE" sz="2000" dirty="0">
                 <a:solidFill>
                   <a:schemeClr val="accent5">
                     <a:lumMod val="50000"/>
@@ -17639,7 +17481,7 @@
               <a:t> of 68.7 %. </a:t>
             </a:r>
             <a:r>
-              <a:rPr lang="et-EE" sz="2300" dirty="0" err="1">
+              <a:rPr lang="et-EE" sz="2000" dirty="0" err="1">
                 <a:solidFill>
                   <a:schemeClr val="accent5">
                     <a:lumMod val="50000"/>
@@ -17651,7 +17493,7 @@
               <a:t>Lastly</a:t>
             </a:r>
             <a:r>
-              <a:rPr lang="et-EE" sz="2300" dirty="0">
+              <a:rPr lang="et-EE" sz="2000" dirty="0">
                 <a:solidFill>
                   <a:schemeClr val="accent5">
                     <a:lumMod val="50000"/>
@@ -17663,7 +17505,7 @@
               <a:t> </a:t>
             </a:r>
             <a:r>
-              <a:rPr lang="et-EE" sz="2300" dirty="0" err="1">
+              <a:rPr lang="et-EE" sz="2000" dirty="0" err="1">
                 <a:solidFill>
                   <a:schemeClr val="accent5">
                     <a:lumMod val="50000"/>
@@ -17675,7 +17517,7 @@
               <a:t>we</a:t>
             </a:r>
             <a:r>
-              <a:rPr lang="et-EE" sz="2300" dirty="0">
+              <a:rPr lang="et-EE" sz="2000" dirty="0">
                 <a:solidFill>
                   <a:schemeClr val="accent5">
                     <a:lumMod val="50000"/>
@@ -17687,7 +17529,7 @@
               <a:t> </a:t>
             </a:r>
             <a:r>
-              <a:rPr lang="et-EE" sz="2300" dirty="0" err="1">
+              <a:rPr lang="et-EE" sz="2000" dirty="0" err="1">
                 <a:solidFill>
                   <a:schemeClr val="accent5">
                     <a:lumMod val="50000"/>
@@ -17699,7 +17541,7 @@
               <a:t>tried</a:t>
             </a:r>
             <a:r>
-              <a:rPr lang="et-EE" sz="2300" dirty="0">
+              <a:rPr lang="et-EE" sz="2000" dirty="0">
                 <a:solidFill>
                   <a:schemeClr val="accent5">
                     <a:lumMod val="50000"/>
@@ -17711,7 +17553,7 @@
               <a:t> a </a:t>
             </a:r>
             <a:r>
-              <a:rPr lang="et-EE" sz="2300" dirty="0" err="1">
+              <a:rPr lang="et-EE" sz="2000" dirty="0" err="1">
                 <a:solidFill>
                   <a:schemeClr val="accent5">
                     <a:lumMod val="50000"/>
@@ -17723,7 +17565,7 @@
               <a:t>LightLGB</a:t>
             </a:r>
             <a:r>
-              <a:rPr lang="et-EE" sz="2300" dirty="0">
+              <a:rPr lang="et-EE" sz="2000" dirty="0">
                 <a:solidFill>
                   <a:schemeClr val="accent5">
                     <a:lumMod val="50000"/>
@@ -17735,7 +17577,7 @@
               <a:t> </a:t>
             </a:r>
             <a:r>
-              <a:rPr lang="et-EE" sz="2300" dirty="0" err="1">
+              <a:rPr lang="et-EE" sz="2000" dirty="0" err="1">
                 <a:solidFill>
                   <a:schemeClr val="accent5">
                     <a:lumMod val="50000"/>
@@ -17747,19 +17589,43 @@
               <a:t>classifier</a:t>
             </a:r>
             <a:r>
-              <a:rPr lang="et-EE" sz="2300" dirty="0">
-                <a:solidFill>
-                  <a:schemeClr val="accent5">
-                    <a:lumMod val="50000"/>
-                  </a:schemeClr>
-                </a:solidFill>
-                <a:latin typeface="Times New Roman" panose="02020603050405020304" pitchFamily="18" charset="0"/>
-                <a:cs typeface="Times New Roman" panose="02020603050405020304" pitchFamily="18" charset="0"/>
-              </a:rPr>
-              <a:t> on Project </a:t>
-            </a:r>
-            <a:r>
-              <a:rPr lang="et-EE" sz="2300" dirty="0" err="1">
+              <a:rPr lang="et-EE" sz="2000" dirty="0">
+                <a:solidFill>
+                  <a:schemeClr val="accent5">
+                    <a:lumMod val="50000"/>
+                  </a:schemeClr>
+                </a:solidFill>
+                <a:latin typeface="Times New Roman" panose="02020603050405020304" pitchFamily="18" charset="0"/>
+                <a:cs typeface="Times New Roman" panose="02020603050405020304" pitchFamily="18" charset="0"/>
+              </a:rPr>
+              <a:t> on </a:t>
+            </a:r>
+            <a:r>
+              <a:rPr lang="et-EE" sz="2000" dirty="0" err="1" smtClean="0">
+                <a:solidFill>
+                  <a:schemeClr val="accent5">
+                    <a:lumMod val="50000"/>
+                  </a:schemeClr>
+                </a:solidFill>
+                <a:latin typeface="Times New Roman" panose="02020603050405020304" pitchFamily="18" charset="0"/>
+                <a:cs typeface="Times New Roman" panose="02020603050405020304" pitchFamily="18" charset="0"/>
+              </a:rPr>
+              <a:t>project</a:t>
+            </a:r>
+            <a:r>
+              <a:rPr lang="et-EE" sz="2000" dirty="0" smtClean="0">
+                <a:solidFill>
+                  <a:schemeClr val="accent5">
+                    <a:lumMod val="50000"/>
+                  </a:schemeClr>
+                </a:solidFill>
+                <a:latin typeface="Times New Roman" panose="02020603050405020304" pitchFamily="18" charset="0"/>
+                <a:cs typeface="Times New Roman" panose="02020603050405020304" pitchFamily="18" charset="0"/>
+              </a:rPr>
+              <a:t> </a:t>
+            </a:r>
+            <a:r>
+              <a:rPr lang="et-EE" sz="2000" dirty="0" err="1">
                 <a:solidFill>
                   <a:schemeClr val="accent5">
                     <a:lumMod val="50000"/>
@@ -17771,7 +17637,7 @@
               <a:t>titles</a:t>
             </a:r>
             <a:r>
-              <a:rPr lang="et-EE" sz="2300" dirty="0">
+              <a:rPr lang="et-EE" sz="2000" dirty="0">
                 <a:solidFill>
                   <a:schemeClr val="accent5">
                     <a:lumMod val="50000"/>
@@ -17783,7 +17649,7 @@
               <a:t> </a:t>
             </a:r>
             <a:r>
-              <a:rPr lang="et-EE" sz="2300" dirty="0" err="1">
+              <a:rPr lang="et-EE" sz="2000" dirty="0" err="1">
                 <a:solidFill>
                   <a:schemeClr val="accent5">
                     <a:lumMod val="50000"/>
@@ -17795,7 +17661,7 @@
               <a:t>which</a:t>
             </a:r>
             <a:r>
-              <a:rPr lang="et-EE" sz="2300" dirty="0">
+              <a:rPr lang="et-EE" sz="2000" dirty="0">
                 <a:solidFill>
                   <a:schemeClr val="accent5">
                     <a:lumMod val="50000"/>
@@ -17807,7 +17673,7 @@
               <a:t> </a:t>
             </a:r>
             <a:r>
-              <a:rPr lang="et-EE" sz="2300" dirty="0" err="1">
+              <a:rPr lang="et-EE" sz="2000" dirty="0" err="1">
                 <a:solidFill>
                   <a:schemeClr val="accent5">
                     <a:lumMod val="50000"/>
@@ -17819,7 +17685,7 @@
               <a:t>gave</a:t>
             </a:r>
             <a:r>
-              <a:rPr lang="et-EE" sz="2300" dirty="0">
+              <a:rPr lang="et-EE" sz="2000" dirty="0">
                 <a:solidFill>
                   <a:schemeClr val="accent5">
                     <a:lumMod val="50000"/>
@@ -17831,7 +17697,7 @@
               <a:t> </a:t>
             </a:r>
             <a:r>
-              <a:rPr lang="et-EE" sz="2300" dirty="0" err="1">
+              <a:rPr lang="et-EE" sz="2000" dirty="0" err="1">
                 <a:solidFill>
                   <a:schemeClr val="accent5">
                     <a:lumMod val="50000"/>
@@ -17843,7 +17709,7 @@
               <a:t>an</a:t>
             </a:r>
             <a:r>
-              <a:rPr lang="et-EE" sz="2300" dirty="0">
+              <a:rPr lang="et-EE" sz="2000" dirty="0">
                 <a:solidFill>
                   <a:schemeClr val="accent5">
                     <a:lumMod val="50000"/>
@@ -17855,7 +17721,7 @@
               <a:t> </a:t>
             </a:r>
             <a:r>
-              <a:rPr lang="et-EE" sz="2300" dirty="0" err="1">
+              <a:rPr lang="et-EE" sz="2000" dirty="0" err="1">
                 <a:solidFill>
                   <a:schemeClr val="accent5">
                     <a:lumMod val="50000"/>
@@ -17867,7 +17733,7 @@
               <a:t>accuracy</a:t>
             </a:r>
             <a:r>
-              <a:rPr lang="et-EE" sz="2300" dirty="0">
+              <a:rPr lang="et-EE" sz="2000" dirty="0">
                 <a:solidFill>
                   <a:schemeClr val="accent5">
                     <a:lumMod val="50000"/>
@@ -17879,7 +17745,7 @@
               <a:t> of 70 % and a </a:t>
             </a:r>
             <a:r>
-              <a:rPr lang="et-EE" sz="2300" dirty="0" err="1">
+              <a:rPr lang="et-EE" sz="2000" dirty="0" err="1">
                 <a:solidFill>
                   <a:schemeClr val="accent5">
                     <a:lumMod val="50000"/>
@@ -17891,7 +17757,7 @@
               <a:t>fairly</a:t>
             </a:r>
             <a:r>
-              <a:rPr lang="et-EE" sz="2300" dirty="0">
+              <a:rPr lang="et-EE" sz="2000" dirty="0">
                 <a:solidFill>
                   <a:schemeClr val="accent5">
                     <a:lumMod val="50000"/>
@@ -17903,7 +17769,7 @@
               <a:t> </a:t>
             </a:r>
             <a:r>
-              <a:rPr lang="et-EE" sz="2300" dirty="0" err="1">
+              <a:rPr lang="et-EE" sz="2000" dirty="0" err="1">
                 <a:solidFill>
                   <a:schemeClr val="accent5">
                     <a:lumMod val="50000"/>
@@ -17915,7 +17781,7 @@
               <a:t>good</a:t>
             </a:r>
             <a:r>
-              <a:rPr lang="et-EE" sz="2300" dirty="0">
+              <a:rPr lang="et-EE" sz="2000" dirty="0">
                 <a:solidFill>
                   <a:schemeClr val="accent5">
                     <a:lumMod val="50000"/>
@@ -17927,7 +17793,7 @@
               <a:t> ROC </a:t>
             </a:r>
             <a:r>
-              <a:rPr lang="et-EE" sz="2300" dirty="0" err="1">
+              <a:rPr lang="et-EE" sz="2000" dirty="0" err="1">
                 <a:solidFill>
                   <a:schemeClr val="accent5">
                     <a:lumMod val="50000"/>
@@ -17939,7 +17805,7 @@
               <a:t>curve</a:t>
             </a:r>
             <a:r>
-              <a:rPr lang="et-EE" sz="2300" dirty="0">
+              <a:rPr lang="et-EE" sz="2000" dirty="0">
                 <a:solidFill>
                   <a:schemeClr val="accent5">
                     <a:lumMod val="50000"/>
@@ -18119,7 +17985,6 @@
               <a:rPr lang="et-EE" dirty="0" smtClean="0"/>
               <a:t>OBJECTIVES</a:t>
             </a:r>
-            <a:endParaRPr lang="et-EE" dirty="0" smtClean="0"/>
           </a:p>
         </p:txBody>
       </p:sp>
@@ -18420,14 +18285,28 @@
                 <a:latin typeface="Times New Roman" panose="02020603050405020304" pitchFamily="18" charset="0"/>
                 <a:cs typeface="Times New Roman" panose="02020603050405020304" pitchFamily="18" charset="0"/>
               </a:rPr>
-              <a:t> Project </a:t>
+              <a:t> </a:t>
             </a:r>
             <a:r>
               <a:rPr lang="et-EE" sz="2000" b="0" u="none" dirty="0" err="1" smtClean="0">
                 <a:latin typeface="Times New Roman" panose="02020603050405020304" pitchFamily="18" charset="0"/>
                 <a:cs typeface="Times New Roman" panose="02020603050405020304" pitchFamily="18" charset="0"/>
               </a:rPr>
-              <a:t>witn</a:t>
+              <a:t>project</a:t>
+            </a:r>
+            <a:r>
+              <a:rPr lang="et-EE" sz="2000" b="0" u="none" dirty="0" smtClean="0">
+                <a:latin typeface="Times New Roman" panose="02020603050405020304" pitchFamily="18" charset="0"/>
+                <a:cs typeface="Times New Roman" panose="02020603050405020304" pitchFamily="18" charset="0"/>
+              </a:rPr>
+              <a:t> </a:t>
+            </a:r>
+            <a:r>
+              <a:rPr lang="et-EE" sz="2000" b="0" u="none" dirty="0" err="1" smtClean="0">
+                <a:latin typeface="Times New Roman" panose="02020603050405020304" pitchFamily="18" charset="0"/>
+                <a:cs typeface="Times New Roman" panose="02020603050405020304" pitchFamily="18" charset="0"/>
+              </a:rPr>
+              <a:t>with</a:t>
             </a:r>
             <a:r>
               <a:rPr lang="et-EE" sz="2000" b="0" u="none" dirty="0" smtClean="0">
@@ -18559,8 +18438,19 @@
                 <a:latin typeface="Times New Roman" panose="02020603050405020304" pitchFamily="18" charset="0"/>
                 <a:cs typeface="Times New Roman" panose="02020603050405020304" pitchFamily="18" charset="0"/>
               </a:rPr>
-              <a:t> Project</a:t>
-            </a:r>
+              <a:t> </a:t>
+            </a:r>
+            <a:r>
+              <a:rPr lang="et-EE" sz="2000" b="0" u="none" dirty="0" err="1" smtClean="0">
+                <a:latin typeface="Times New Roman" panose="02020603050405020304" pitchFamily="18" charset="0"/>
+                <a:cs typeface="Times New Roman" panose="02020603050405020304" pitchFamily="18" charset="0"/>
+              </a:rPr>
+              <a:t>project</a:t>
+            </a:r>
+            <a:endParaRPr lang="et-EE" sz="2000" b="0" u="none" dirty="0" smtClean="0">
+              <a:latin typeface="Times New Roman" panose="02020603050405020304" pitchFamily="18" charset="0"/>
+              <a:cs typeface="Times New Roman" panose="02020603050405020304" pitchFamily="18" charset="0"/>
+            </a:endParaRPr>
           </a:p>
           <a:p>
             <a:pPr marL="342900" indent="-342900" algn="l">
@@ -18658,10 +18548,6 @@
               </a:rPr>
               <a:t>.</a:t>
             </a:r>
-            <a:endParaRPr lang="et-EE" sz="2000" b="0" u="none" dirty="0" smtClean="0">
-              <a:latin typeface="Times New Roman" panose="02020603050405020304" pitchFamily="18" charset="0"/>
-              <a:cs typeface="Times New Roman" panose="02020603050405020304" pitchFamily="18" charset="0"/>
-            </a:endParaRPr>
           </a:p>
         </p:txBody>
       </p:sp>

</xml_diff>